<commit_message>
+ Finish hw2 with ppt
</commit_message>
<xml_diff>
--- a/hw2/118039910141-于泽汉-hw2.pptx
+++ b/hw2/118039910141-于泽汉-hw2.pptx
@@ -8,20 +8,22 @@
     <p:sldId id="256" r:id="rId2"/>
     <p:sldId id="257" r:id="rId3"/>
     <p:sldId id="258" r:id="rId4"/>
-    <p:sldId id="259" r:id="rId5"/>
-    <p:sldId id="260" r:id="rId6"/>
-    <p:sldId id="263" r:id="rId7"/>
-    <p:sldId id="265" r:id="rId8"/>
-    <p:sldId id="266" r:id="rId9"/>
-    <p:sldId id="267" r:id="rId10"/>
-    <p:sldId id="274" r:id="rId11"/>
-    <p:sldId id="276" r:id="rId12"/>
-    <p:sldId id="268" r:id="rId13"/>
-    <p:sldId id="272" r:id="rId14"/>
-    <p:sldId id="270" r:id="rId15"/>
-    <p:sldId id="271" r:id="rId16"/>
-    <p:sldId id="273" r:id="rId17"/>
-    <p:sldId id="275" r:id="rId18"/>
+    <p:sldId id="263" r:id="rId5"/>
+    <p:sldId id="265" r:id="rId6"/>
+    <p:sldId id="266" r:id="rId7"/>
+    <p:sldId id="267" r:id="rId8"/>
+    <p:sldId id="272" r:id="rId9"/>
+    <p:sldId id="270" r:id="rId10"/>
+    <p:sldId id="271" r:id="rId11"/>
+    <p:sldId id="273" r:id="rId12"/>
+    <p:sldId id="280" r:id="rId13"/>
+    <p:sldId id="281" r:id="rId14"/>
+    <p:sldId id="276" r:id="rId15"/>
+    <p:sldId id="277" r:id="rId16"/>
+    <p:sldId id="268" r:id="rId17"/>
+    <p:sldId id="278" r:id="rId18"/>
+    <p:sldId id="279" r:id="rId19"/>
+    <p:sldId id="275" r:id="rId20"/>
   </p:sldIdLst>
   <p:sldSz cx="12192000" cy="6858000"/>
   <p:notesSz cx="6858000" cy="9144000"/>
@@ -3206,7 +3208,7 @@
           <a:p>
             <a:r>
               <a:rPr lang="zh-CN" altLang="en-US" dirty="0" smtClean="0"/>
-              <a:t>使用向量化思想提速</a:t>
+              <a:t>测试结果</a:t>
             </a:r>
             <a:endParaRPr lang="zh-CN" altLang="en-US" dirty="0"/>
           </a:p>
@@ -3234,54 +3236,24 @@
         </p:blipFill>
         <p:spPr>
           <a:xfrm>
-            <a:off x="838200" y="1054099"/>
-            <a:ext cx="4965700" cy="5658341"/>
+            <a:off x="736600" y="2735451"/>
+            <a:ext cx="4305300" cy="1387095"/>
           </a:xfrm>
           <a:prstGeom prst="rect">
             <a:avLst/>
           </a:prstGeom>
         </p:spPr>
       </p:pic>
-      <p:pic>
-        <p:nvPicPr>
-          <p:cNvPr id="5" name="图片 4"/>
-          <p:cNvPicPr>
-            <a:picLocks noChangeAspect="1"/>
-          </p:cNvPicPr>
-          <p:nvPr/>
-        </p:nvPicPr>
-        <p:blipFill>
-          <a:blip r:embed="rId3">
-            <a:extLst>
-              <a:ext uri="{28A0092B-C50C-407E-A947-70E740481C1C}">
-                <a14:useLocalDpi xmlns:a14="http://schemas.microsoft.com/office/drawing/2010/main" val="0"/>
-              </a:ext>
-            </a:extLst>
-          </a:blip>
-          <a:stretch>
-            <a:fillRect/>
-          </a:stretch>
-        </p:blipFill>
-        <p:spPr>
-          <a:xfrm>
-            <a:off x="6295852" y="2187574"/>
-            <a:ext cx="5629861" cy="3803960"/>
-          </a:xfrm>
-          <a:prstGeom prst="rect">
-            <a:avLst/>
-          </a:prstGeom>
-        </p:spPr>
-      </p:pic>
-      <p:sp>
-        <p:nvSpPr>
-          <p:cNvPr id="6" name="文本框 5"/>
+      <p:sp>
+        <p:nvSpPr>
+          <p:cNvPr id="5" name="文本框 4"/>
           <p:cNvSpPr txBox="1"/>
           <p:nvPr/>
         </p:nvSpPr>
         <p:spPr>
           <a:xfrm>
-            <a:off x="6295852" y="1054099"/>
-            <a:ext cx="2282997" cy="874407"/>
+            <a:off x="5880100" y="2305615"/>
+            <a:ext cx="6100686" cy="2246769"/>
           </a:xfrm>
           <a:prstGeom prst="rect">
             <a:avLst/>
@@ -3289,80 +3261,112 @@
           <a:noFill/>
         </p:spPr>
         <p:txBody>
-          <a:bodyPr wrap="none" rtlCol="0">
+          <a:bodyPr wrap="square" rtlCol="0">
             <a:spAutoFit/>
           </a:bodyPr>
           <a:lstStyle/>
           <a:p>
-            <a:pPr>
-              <a:lnSpc>
-                <a:spcPct val="150000"/>
-              </a:lnSpc>
+            <a:pPr marL="285750" indent="-285750">
+              <a:buFont typeface="Arial" panose="020B0604020202020204" pitchFamily="34" charset="0"/>
+              <a:buChar char="•"/>
             </a:pPr>
             <a:r>
-              <a:rPr lang="zh-CN" altLang="en-US" dirty="0" smtClean="0">
+              <a:rPr lang="zh-CN" altLang="en-US" sz="2000" dirty="0">
                 <a:latin typeface="微软雅黑" panose="020B0503020204020204" pitchFamily="34" charset="-122"/>
                 <a:ea typeface="微软雅黑" panose="020B0503020204020204" pitchFamily="34" charset="-122"/>
               </a:rPr>
-              <a:t>小网络：</a:t>
-            </a:r>
-            <a:r>
-              <a:rPr lang="en-US" altLang="zh-CN" dirty="0" smtClean="0">
+              <a:t>即使训练集和测试集并不相同，但是我们的网络还是</a:t>
+            </a:r>
+            <a:r>
+              <a:rPr lang="zh-CN" altLang="en-US" sz="2000" dirty="0" smtClean="0">
                 <a:latin typeface="微软雅黑" panose="020B0503020204020204" pitchFamily="34" charset="-122"/>
                 <a:ea typeface="微软雅黑" panose="020B0503020204020204" pitchFamily="34" charset="-122"/>
               </a:rPr>
-              <a:t>~10</a:t>
-            </a:r>
-            <a:r>
-              <a:rPr lang="zh-CN" altLang="en-US" dirty="0" smtClean="0">
+              <a:t>能达到 </a:t>
+            </a:r>
+            <a:r>
+              <a:rPr lang="en-US" altLang="zh-CN" sz="2000" dirty="0">
                 <a:latin typeface="微软雅黑" panose="020B0503020204020204" pitchFamily="34" charset="-122"/>
                 <a:ea typeface="微软雅黑" panose="020B0503020204020204" pitchFamily="34" charset="-122"/>
               </a:rPr>
-              <a:t>倍</a:t>
-            </a:r>
-            <a:endParaRPr lang="en-US" altLang="zh-CN" dirty="0" smtClean="0">
+              <a:t>100% </a:t>
+            </a:r>
+            <a:r>
+              <a:rPr lang="zh-CN" altLang="en-US" sz="2000" dirty="0">
+                <a:latin typeface="微软雅黑" panose="020B0503020204020204" pitchFamily="34" charset="-122"/>
+                <a:ea typeface="微软雅黑" panose="020B0503020204020204" pitchFamily="34" charset="-122"/>
+              </a:rPr>
+              <a:t>的准确率，也就是说，网络依旧能识别出不同类别图像的特征，体现了该</a:t>
+            </a:r>
+            <a:r>
+              <a:rPr lang="zh-CN" altLang="en-US" sz="2000" dirty="0" smtClean="0">
+                <a:latin typeface="微软雅黑" panose="020B0503020204020204" pitchFamily="34" charset="-122"/>
+                <a:ea typeface="微软雅黑" panose="020B0503020204020204" pitchFamily="34" charset="-122"/>
+              </a:rPr>
+              <a:t>网络模型</a:t>
+            </a:r>
+            <a:r>
+              <a:rPr lang="zh-CN" altLang="en-US" sz="2000" dirty="0">
+                <a:latin typeface="微软雅黑" panose="020B0503020204020204" pitchFamily="34" charset="-122"/>
+                <a:ea typeface="微软雅黑" panose="020B0503020204020204" pitchFamily="34" charset="-122"/>
+              </a:rPr>
+              <a:t>较好的</a:t>
+            </a:r>
+            <a:r>
+              <a:rPr lang="zh-CN" altLang="en-US" sz="2000" dirty="0" smtClean="0">
+                <a:latin typeface="微软雅黑" panose="020B0503020204020204" pitchFamily="34" charset="-122"/>
+                <a:ea typeface="微软雅黑" panose="020B0503020204020204" pitchFamily="34" charset="-122"/>
+              </a:rPr>
+              <a:t>通用性。</a:t>
+            </a:r>
+            <a:endParaRPr lang="en-US" altLang="zh-CN" sz="2000" dirty="0" smtClean="0">
               <a:latin typeface="微软雅黑" panose="020B0503020204020204" pitchFamily="34" charset="-122"/>
               <a:ea typeface="微软雅黑" panose="020B0503020204020204" pitchFamily="34" charset="-122"/>
             </a:endParaRPr>
           </a:p>
           <a:p>
-            <a:pPr>
-              <a:lnSpc>
-                <a:spcPct val="150000"/>
-              </a:lnSpc>
+            <a:pPr marL="285750" indent="-285750">
+              <a:buFont typeface="Arial" panose="020B0604020202020204" pitchFamily="34" charset="0"/>
+              <a:buChar char="•"/>
             </a:pPr>
-            <a:r>
-              <a:rPr lang="zh-CN" altLang="en-US" dirty="0" smtClean="0">
+            <a:endParaRPr lang="en-US" altLang="zh-CN" sz="2000" dirty="0" smtClean="0">
+              <a:latin typeface="微软雅黑" panose="020B0503020204020204" pitchFamily="34" charset="-122"/>
+              <a:ea typeface="微软雅黑" panose="020B0503020204020204" pitchFamily="34" charset="-122"/>
+            </a:endParaRPr>
+          </a:p>
+          <a:p>
+            <a:pPr marL="285750" indent="-285750">
+              <a:buFont typeface="Arial" panose="020B0604020202020204" pitchFamily="34" charset="0"/>
+              <a:buChar char="•"/>
+            </a:pPr>
+            <a:r>
+              <a:rPr lang="zh-CN" altLang="en-US" sz="2000" dirty="0" smtClean="0">
                 <a:latin typeface="微软雅黑" panose="020B0503020204020204" pitchFamily="34" charset="-122"/>
                 <a:ea typeface="微软雅黑" panose="020B0503020204020204" pitchFamily="34" charset="-122"/>
               </a:rPr>
-              <a:t>大网络：</a:t>
-            </a:r>
-            <a:r>
-              <a:rPr lang="en-US" altLang="zh-CN" dirty="0" smtClean="0">
+              <a:t>分类</a:t>
+            </a:r>
+            <a:r>
+              <a:rPr lang="zh-CN" altLang="en-US" sz="2000" dirty="0">
                 <a:latin typeface="微软雅黑" panose="020B0503020204020204" pitchFamily="34" charset="-122"/>
                 <a:ea typeface="微软雅黑" panose="020B0503020204020204" pitchFamily="34" charset="-122"/>
               </a:rPr>
-              <a:t>~10-100</a:t>
-            </a:r>
-            <a:r>
-              <a:rPr lang="zh-CN" altLang="en-US" dirty="0">
+              <a:t>速度也很快，说明我们的网络性能较好，可以在短时间内处理大量的数据。</a:t>
+            </a:r>
+            <a:r>
+              <a:rPr lang="zh-CN" altLang="en-US" sz="2000" dirty="0" smtClean="0">
                 <a:latin typeface="微软雅黑" panose="020B0503020204020204" pitchFamily="34" charset="-122"/>
                 <a:ea typeface="微软雅黑" panose="020B0503020204020204" pitchFamily="34" charset="-122"/>
               </a:rPr>
-              <a:t>倍</a:t>
-            </a:r>
-            <a:endParaRPr lang="zh-CN" altLang="en-US" dirty="0" smtClean="0">
-              <a:latin typeface="微软雅黑" panose="020B0503020204020204" pitchFamily="34" charset="-122"/>
-              <a:ea typeface="微软雅黑" panose="020B0503020204020204" pitchFamily="34" charset="-122"/>
-            </a:endParaRPr>
+              <a:t> </a:t>
+            </a:r>
           </a:p>
         </p:txBody>
       </p:sp>
     </p:spTree>
     <p:extLst>
       <p:ext uri="{BB962C8B-B14F-4D97-AF65-F5344CB8AC3E}">
-        <p14:creationId xmlns:p14="http://schemas.microsoft.com/office/powerpoint/2010/main" val="2123221298"/>
+        <p14:creationId xmlns:p14="http://schemas.microsoft.com/office/powerpoint/2010/main" val="2508279034"/>
       </p:ext>
     </p:extLst>
   </p:cSld>
@@ -3413,15 +3417,222 @@
           <a:p>
             <a:r>
               <a:rPr lang="zh-CN" altLang="en-US" dirty="0" smtClean="0"/>
-              <a:t>使用 </a:t>
-            </a:r>
-            <a:r>
-              <a:rPr lang="en-US" altLang="zh-CN" dirty="0" smtClean="0"/>
-              <a:t>pickle </a:t>
-            </a:r>
-            <a:r>
-              <a:rPr lang="zh-CN" altLang="en-US" dirty="0" smtClean="0"/>
-              <a:t>库导入导出变量</a:t>
+              <a:t>参考资料</a:t>
+            </a:r>
+            <a:endParaRPr lang="zh-CN" altLang="en-US" dirty="0"/>
+          </a:p>
+        </p:txBody>
+      </p:sp>
+      <p:sp>
+        <p:nvSpPr>
+          <p:cNvPr id="3" name="内容占位符 2"/>
+          <p:cNvSpPr>
+            <a:spLocks noGrp="1"/>
+          </p:cNvSpPr>
+          <p:nvPr>
+            <p:ph idx="1"/>
+          </p:nvPr>
+        </p:nvSpPr>
+        <p:spPr>
+          <a:xfrm>
+            <a:off x="838200" y="1825625"/>
+            <a:ext cx="10629900" cy="4351338"/>
+          </a:xfrm>
+        </p:spPr>
+        <p:txBody>
+          <a:bodyPr>
+            <a:noAutofit/>
+          </a:bodyPr>
+          <a:lstStyle/>
+          <a:p>
+            <a:pPr marL="342900" indent="-342900">
+              <a:buFont typeface="+mj-lt"/>
+              <a:buAutoNum type="arabicPeriod"/>
+            </a:pPr>
+            <a:r>
+              <a:rPr lang="en-US" altLang="zh-CN" sz="1800" dirty="0" smtClean="0">
+                <a:latin typeface="Times New Roman" panose="02020603050405020304" pitchFamily="18" charset="0"/>
+                <a:cs typeface="Times New Roman" panose="02020603050405020304" pitchFamily="18" charset="0"/>
+              </a:rPr>
+              <a:t>Wikipedia contributors. (2019, May 29). Artificial neural network. In Wikipedia, The Free Encyclopedia. Retrieved 18:24, May 30, 2019, from https://en.wikipedia.org/w/index.php?title=Artificial_neural_network&amp;oldid=899409597</a:t>
+            </a:r>
+          </a:p>
+          <a:p>
+            <a:pPr marL="342900" indent="-342900">
+              <a:buFont typeface="+mj-lt"/>
+              <a:buAutoNum type="arabicPeriod"/>
+            </a:pPr>
+            <a:r>
+              <a:rPr lang="en-US" altLang="zh-CN" sz="1800" dirty="0" smtClean="0">
+                <a:latin typeface="Times New Roman" panose="02020603050405020304" pitchFamily="18" charset="0"/>
+                <a:cs typeface="Times New Roman" panose="02020603050405020304" pitchFamily="18" charset="0"/>
+              </a:rPr>
+              <a:t>Wikipedia contributors. (2019, May 8). </a:t>
+            </a:r>
+            <a:r>
+              <a:rPr lang="en-US" altLang="zh-CN" sz="1800" dirty="0" err="1" smtClean="0">
+                <a:latin typeface="Times New Roman" panose="02020603050405020304" pitchFamily="18" charset="0"/>
+                <a:cs typeface="Times New Roman" panose="02020603050405020304" pitchFamily="18" charset="0"/>
+              </a:rPr>
+              <a:t>Hyperparameter</a:t>
+            </a:r>
+            <a:r>
+              <a:rPr lang="en-US" altLang="zh-CN" sz="1800" dirty="0" smtClean="0">
+                <a:latin typeface="Times New Roman" panose="02020603050405020304" pitchFamily="18" charset="0"/>
+                <a:cs typeface="Times New Roman" panose="02020603050405020304" pitchFamily="18" charset="0"/>
+              </a:rPr>
+              <a:t> optimization. In Wikipedia, The Free Encyclopedia. Retrieved 18:22, May 30, 2019, from https://en.wikipedia.org/w/index.php?title=Hyperparameter_optimization&amp;oldid=896193455</a:t>
+            </a:r>
+          </a:p>
+          <a:p>
+            <a:pPr marL="342900" indent="-342900">
+              <a:buFont typeface="+mj-lt"/>
+              <a:buAutoNum type="arabicPeriod"/>
+            </a:pPr>
+            <a:r>
+              <a:rPr lang="en-US" altLang="zh-CN" sz="1800" dirty="0" smtClean="0">
+                <a:latin typeface="Times New Roman" panose="02020603050405020304" pitchFamily="18" charset="0"/>
+                <a:cs typeface="Times New Roman" panose="02020603050405020304" pitchFamily="18" charset="0"/>
+              </a:rPr>
+              <a:t>Wikipedia contributors. (2019, May 19). Backpropagation. In Wikipedia, The Free Encyclopedia. Retrieved 18:23, May 30, 2019, from https://en.wikipedia.org/w/index.php?title=Backpropagation&amp;oldid=897855738</a:t>
+            </a:r>
+          </a:p>
+          <a:p>
+            <a:pPr marL="342900" indent="-342900">
+              <a:buFont typeface="+mj-lt"/>
+              <a:buAutoNum type="arabicPeriod"/>
+            </a:pPr>
+            <a:r>
+              <a:rPr lang="en-US" altLang="zh-CN" sz="1800" dirty="0" smtClean="0">
+                <a:latin typeface="Times New Roman" panose="02020603050405020304" pitchFamily="18" charset="0"/>
+                <a:cs typeface="Times New Roman" panose="02020603050405020304" pitchFamily="18" charset="0"/>
+              </a:rPr>
+              <a:t>Wikipedia contributors. (2019, May 25). Multilayer perceptron. In Wikipedia, The Free Encyclopedia. Retrieved 18:24, May 30, 2019, from https://en.wikipedia.org/w/index.php?title=Multilayer_perceptron&amp;oldid=898748424</a:t>
+            </a:r>
+          </a:p>
+          <a:p>
+            <a:pPr marL="342900" indent="-342900">
+              <a:buFont typeface="+mj-lt"/>
+              <a:buAutoNum type="arabicPeriod"/>
+            </a:pPr>
+            <a:r>
+              <a:rPr lang="en-US" altLang="zh-CN" sz="1800" dirty="0" err="1" smtClean="0">
+                <a:latin typeface="Times New Roman" panose="02020603050405020304" pitchFamily="18" charset="0"/>
+                <a:cs typeface="Times New Roman" panose="02020603050405020304" pitchFamily="18" charset="0"/>
+              </a:rPr>
+              <a:t>St´efan</a:t>
+            </a:r>
+            <a:r>
+              <a:rPr lang="en-US" altLang="zh-CN" sz="1800" dirty="0" smtClean="0">
+                <a:latin typeface="Times New Roman" panose="02020603050405020304" pitchFamily="18" charset="0"/>
+                <a:cs typeface="Times New Roman" panose="02020603050405020304" pitchFamily="18" charset="0"/>
+              </a:rPr>
+              <a:t> van der Walt, S. Chris Colbert and </a:t>
+            </a:r>
+            <a:r>
+              <a:rPr lang="en-US" altLang="zh-CN" sz="1800" dirty="0" err="1" smtClean="0">
+                <a:latin typeface="Times New Roman" panose="02020603050405020304" pitchFamily="18" charset="0"/>
+                <a:cs typeface="Times New Roman" panose="02020603050405020304" pitchFamily="18" charset="0"/>
+              </a:rPr>
+              <a:t>Ga¨el</a:t>
+            </a:r>
+            <a:r>
+              <a:rPr lang="en-US" altLang="zh-CN" sz="1800" dirty="0" smtClean="0">
+                <a:latin typeface="Times New Roman" panose="02020603050405020304" pitchFamily="18" charset="0"/>
+                <a:cs typeface="Times New Roman" panose="02020603050405020304" pitchFamily="18" charset="0"/>
+              </a:rPr>
+              <a:t> </a:t>
+            </a:r>
+            <a:r>
+              <a:rPr lang="en-US" altLang="zh-CN" sz="1800" dirty="0" err="1" smtClean="0">
+                <a:latin typeface="Times New Roman" panose="02020603050405020304" pitchFamily="18" charset="0"/>
+                <a:cs typeface="Times New Roman" panose="02020603050405020304" pitchFamily="18" charset="0"/>
+              </a:rPr>
+              <a:t>Varoquaux</a:t>
+            </a:r>
+            <a:r>
+              <a:rPr lang="en-US" altLang="zh-CN" sz="1800" dirty="0" smtClean="0">
+                <a:latin typeface="Times New Roman" panose="02020603050405020304" pitchFamily="18" charset="0"/>
+                <a:cs typeface="Times New Roman" panose="02020603050405020304" pitchFamily="18" charset="0"/>
+              </a:rPr>
+              <a:t>. The </a:t>
+            </a:r>
+            <a:r>
+              <a:rPr lang="en-US" altLang="zh-CN" sz="1800" dirty="0" err="1" smtClean="0">
+                <a:latin typeface="Times New Roman" panose="02020603050405020304" pitchFamily="18" charset="0"/>
+                <a:cs typeface="Times New Roman" panose="02020603050405020304" pitchFamily="18" charset="0"/>
+              </a:rPr>
+              <a:t>NumPy</a:t>
+            </a:r>
+            <a:r>
+              <a:rPr lang="en-US" altLang="zh-CN" sz="1800" dirty="0" smtClean="0">
+                <a:latin typeface="Times New Roman" panose="02020603050405020304" pitchFamily="18" charset="0"/>
+                <a:cs typeface="Times New Roman" panose="02020603050405020304" pitchFamily="18" charset="0"/>
+              </a:rPr>
+              <a:t> Array: A Structure for Efficient Numerical Computation, Computing in Science &amp; Engineering, 13, 22-30 (2011), DOI:10.1109/MCSE.2011.37</a:t>
+            </a:r>
+            <a:endParaRPr lang="zh-CN" altLang="en-US" sz="1800" dirty="0">
+              <a:latin typeface="Times New Roman" panose="02020603050405020304" pitchFamily="18" charset="0"/>
+              <a:cs typeface="Times New Roman" panose="02020603050405020304" pitchFamily="18" charset="0"/>
+            </a:endParaRPr>
+          </a:p>
+        </p:txBody>
+      </p:sp>
+    </p:spTree>
+    <p:extLst>
+      <p:ext uri="{BB962C8B-B14F-4D97-AF65-F5344CB8AC3E}">
+        <p14:creationId xmlns:p14="http://schemas.microsoft.com/office/powerpoint/2010/main" val="2445029701"/>
+      </p:ext>
+    </p:extLst>
+  </p:cSld>
+  <p:clrMapOvr>
+    <a:masterClrMapping/>
+  </p:clrMapOvr>
+  <p:timing>
+    <p:tnLst>
+      <p:par>
+        <p:cTn id="1" dur="indefinite" restart="never" nodeType="tmRoot"/>
+      </p:par>
+    </p:tnLst>
+  </p:timing>
+</p:sld>
+</file>
+
+<file path=ppt/slides/slide12.xml><?xml version="1.0" encoding="utf-8"?>
+<p:sld xmlns:a="http://schemas.openxmlformats.org/drawingml/2006/main" xmlns:r="http://schemas.openxmlformats.org/officeDocument/2006/relationships" xmlns:p="http://schemas.openxmlformats.org/presentationml/2006/main">
+  <p:cSld>
+    <p:spTree>
+      <p:nvGrpSpPr>
+        <p:cNvPr id="1" name=""/>
+        <p:cNvGrpSpPr/>
+        <p:nvPr/>
+      </p:nvGrpSpPr>
+      <p:grpSpPr>
+        <a:xfrm>
+          <a:off x="0" y="0"/>
+          <a:ext cx="0" cy="0"/>
+          <a:chOff x="0" y="0"/>
+          <a:chExt cx="0" cy="0"/>
+        </a:xfrm>
+      </p:grpSpPr>
+      <p:sp>
+        <p:nvSpPr>
+          <p:cNvPr id="2" name="标题 1"/>
+          <p:cNvSpPr>
+            <a:spLocks noGrp="1"/>
+          </p:cNvSpPr>
+          <p:nvPr>
+            <p:ph type="title"/>
+          </p:nvPr>
+        </p:nvSpPr>
+        <p:spPr/>
+        <p:txBody>
+          <a:bodyPr/>
+          <a:lstStyle/>
+          <a:p>
+            <a:r>
+              <a:rPr lang="zh-CN" altLang="en-US" dirty="0" smtClean="0"/>
+              <a:t>常用图像增强方法</a:t>
             </a:r>
             <a:endParaRPr lang="zh-CN" altLang="en-US" dirty="0"/>
           </a:p>
@@ -3449,158 +3660,8 @@
         </p:blipFill>
         <p:spPr>
           <a:xfrm>
-            <a:off x="1302347" y="2115579"/>
-            <a:ext cx="3219048" cy="685714"/>
-          </a:xfrm>
-          <a:prstGeom prst="rect">
-            <a:avLst/>
-          </a:prstGeom>
-        </p:spPr>
-      </p:pic>
-      <p:pic>
-        <p:nvPicPr>
-          <p:cNvPr id="5" name="图片 4"/>
-          <p:cNvPicPr>
-            <a:picLocks noChangeAspect="1"/>
-          </p:cNvPicPr>
-          <p:nvPr/>
-        </p:nvPicPr>
-        <p:blipFill>
-          <a:blip r:embed="rId3">
-            <a:extLst>
-              <a:ext uri="{28A0092B-C50C-407E-A947-70E740481C1C}">
-                <a14:useLocalDpi xmlns:a14="http://schemas.microsoft.com/office/drawing/2010/main" val="0"/>
-              </a:ext>
-            </a:extLst>
-          </a:blip>
-          <a:stretch>
-            <a:fillRect/>
-          </a:stretch>
-        </p:blipFill>
-        <p:spPr>
-          <a:xfrm>
-            <a:off x="1302347" y="3291310"/>
-            <a:ext cx="3190476" cy="609524"/>
-          </a:xfrm>
-          <a:prstGeom prst="rect">
-            <a:avLst/>
-          </a:prstGeom>
-        </p:spPr>
-      </p:pic>
-      <p:pic>
-        <p:nvPicPr>
-          <p:cNvPr id="6" name="图片 5"/>
-          <p:cNvPicPr>
-            <a:picLocks noChangeAspect="1"/>
-          </p:cNvPicPr>
-          <p:nvPr/>
-        </p:nvPicPr>
-        <p:blipFill>
-          <a:blip r:embed="rId4">
-            <a:extLst>
-              <a:ext uri="{28A0092B-C50C-407E-A947-70E740481C1C}">
-                <a14:useLocalDpi xmlns:a14="http://schemas.microsoft.com/office/drawing/2010/main" val="0"/>
-              </a:ext>
-            </a:extLst>
-          </a:blip>
-          <a:stretch>
-            <a:fillRect/>
-          </a:stretch>
-        </p:blipFill>
-        <p:spPr>
-          <a:xfrm>
-            <a:off x="4521395" y="4240214"/>
-            <a:ext cx="3723809" cy="628571"/>
-          </a:xfrm>
-          <a:prstGeom prst="rect">
-            <a:avLst/>
-          </a:prstGeom>
-        </p:spPr>
-      </p:pic>
-      <p:pic>
-        <p:nvPicPr>
-          <p:cNvPr id="7" name="图片 6"/>
-          <p:cNvPicPr>
-            <a:picLocks noChangeAspect="1"/>
-          </p:cNvPicPr>
-          <p:nvPr/>
-        </p:nvPicPr>
-        <p:blipFill>
-          <a:blip r:embed="rId5">
-            <a:extLst>
-              <a:ext uri="{28A0092B-C50C-407E-A947-70E740481C1C}">
-                <a14:useLocalDpi xmlns:a14="http://schemas.microsoft.com/office/drawing/2010/main" val="0"/>
-              </a:ext>
-            </a:extLst>
-          </a:blip>
-          <a:stretch>
-            <a:fillRect/>
-          </a:stretch>
-        </p:blipFill>
-        <p:spPr>
-          <a:xfrm>
-            <a:off x="4961871" y="4409262"/>
-            <a:ext cx="3142857" cy="590476"/>
-          </a:xfrm>
-          <a:prstGeom prst="rect">
-            <a:avLst/>
-          </a:prstGeom>
-        </p:spPr>
-      </p:pic>
-      <p:pic>
-        <p:nvPicPr>
-          <p:cNvPr id="8" name="图片 7"/>
-          <p:cNvPicPr>
-            <a:picLocks noChangeAspect="1"/>
-          </p:cNvPicPr>
-          <p:nvPr/>
-        </p:nvPicPr>
-        <p:blipFill>
-          <a:blip r:embed="rId6">
-            <a:extLst>
-              <a:ext uri="{28A0092B-C50C-407E-A947-70E740481C1C}">
-                <a14:useLocalDpi xmlns:a14="http://schemas.microsoft.com/office/drawing/2010/main" val="0"/>
-              </a:ext>
-            </a:extLst>
-          </a:blip>
-          <a:stretch>
-            <a:fillRect/>
-          </a:stretch>
-        </p:blipFill>
-        <p:spPr>
-          <a:xfrm>
-            <a:off x="5064252" y="4540214"/>
-            <a:ext cx="3238095" cy="628571"/>
-          </a:xfrm>
-          <a:prstGeom prst="rect">
-            <a:avLst/>
-          </a:prstGeom>
-        </p:spPr>
-      </p:pic>
-      <p:pic>
-        <p:nvPicPr>
-          <p:cNvPr id="9" name="图片 8"/>
-          <p:cNvPicPr>
-            <a:picLocks noChangeAspect="1"/>
-          </p:cNvPicPr>
-          <p:nvPr/>
-        </p:nvPicPr>
-        <p:blipFill>
-          <a:blip r:embed="rId7">
-            <a:extLst>
-              <a:ext uri="{28A0092B-C50C-407E-A947-70E740481C1C}">
-                <a14:useLocalDpi xmlns:a14="http://schemas.microsoft.com/office/drawing/2010/main" val="0"/>
-              </a:ext>
-            </a:extLst>
-          </a:blip>
-          <a:stretch>
-            <a:fillRect/>
-          </a:stretch>
-        </p:blipFill>
-        <p:spPr>
-          <a:xfrm>
-            <a:off x="5064252" y="2040031"/>
-            <a:ext cx="3619048" cy="600000"/>
+            <a:off x="1864702" y="1320800"/>
+            <a:ext cx="8462596" cy="5334000"/>
           </a:xfrm>
           <a:prstGeom prst="rect">
             <a:avLst/>
@@ -3610,181 +3671,7 @@
     </p:spTree>
     <p:extLst>
       <p:ext uri="{BB962C8B-B14F-4D97-AF65-F5344CB8AC3E}">
-        <p14:creationId xmlns:p14="http://schemas.microsoft.com/office/powerpoint/2010/main" val="1345304054"/>
-      </p:ext>
-    </p:extLst>
-  </p:cSld>
-  <p:clrMapOvr>
-    <a:masterClrMapping/>
-  </p:clrMapOvr>
-</p:sld>
-</file>
-
-<file path=ppt/slides/slide12.xml><?xml version="1.0" encoding="utf-8"?>
-<p:sld xmlns:a="http://schemas.openxmlformats.org/drawingml/2006/main" xmlns:r="http://schemas.openxmlformats.org/officeDocument/2006/relationships" xmlns:p="http://schemas.openxmlformats.org/presentationml/2006/main">
-  <p:cSld>
-    <p:spTree>
-      <p:nvGrpSpPr>
-        <p:cNvPr id="1" name=""/>
-        <p:cNvGrpSpPr/>
-        <p:nvPr/>
-      </p:nvGrpSpPr>
-      <p:grpSpPr>
-        <a:xfrm>
-          <a:off x="0" y="0"/>
-          <a:ext cx="0" cy="0"/>
-          <a:chOff x="0" y="0"/>
-          <a:chExt cx="0" cy="0"/>
-        </a:xfrm>
-      </p:grpSpPr>
-      <p:sp>
-        <p:nvSpPr>
-          <p:cNvPr id="2" name="标题 1"/>
-          <p:cNvSpPr>
-            <a:spLocks noGrp="1"/>
-          </p:cNvSpPr>
-          <p:nvPr>
-            <p:ph type="title"/>
-          </p:nvPr>
-        </p:nvSpPr>
-        <p:spPr/>
-        <p:txBody>
-          <a:bodyPr/>
-          <a:lstStyle/>
-          <a:p>
-            <a:r>
-              <a:rPr lang="zh-CN" altLang="en-US" dirty="0" smtClean="0"/>
-              <a:t>超参数优化</a:t>
-            </a:r>
-            <a:endParaRPr lang="zh-CN" altLang="en-US" dirty="0"/>
-          </a:p>
-        </p:txBody>
-      </p:sp>
-      <p:sp>
-        <p:nvSpPr>
-          <p:cNvPr id="3" name="内容占位符 2"/>
-          <p:cNvSpPr>
-            <a:spLocks noGrp="1"/>
-          </p:cNvSpPr>
-          <p:nvPr>
-            <p:ph idx="1"/>
-          </p:nvPr>
-        </p:nvSpPr>
-        <p:spPr/>
-        <p:txBody>
-          <a:bodyPr/>
-          <a:lstStyle/>
-          <a:p>
-            <a:r>
-              <a:rPr lang="zh-CN" altLang="en-US" dirty="0" smtClean="0"/>
-              <a:t>网格搜索（</a:t>
-            </a:r>
-            <a:r>
-              <a:rPr lang="en-US" altLang="zh-CN" dirty="0" smtClean="0"/>
-              <a:t>Grid search</a:t>
-            </a:r>
-            <a:r>
-              <a:rPr lang="zh-CN" altLang="en-US" dirty="0" smtClean="0"/>
-              <a:t>）</a:t>
-            </a:r>
-            <a:endParaRPr lang="en-US" altLang="zh-CN" dirty="0" smtClean="0"/>
-          </a:p>
-          <a:p>
-            <a:r>
-              <a:rPr lang="zh-CN" altLang="en-US" dirty="0" smtClean="0"/>
-              <a:t>随机搜索（</a:t>
-            </a:r>
-            <a:r>
-              <a:rPr lang="en-US" altLang="zh-CN" dirty="0" smtClean="0"/>
-              <a:t>Random search</a:t>
-            </a:r>
-            <a:r>
-              <a:rPr lang="zh-CN" altLang="en-US" dirty="0" smtClean="0"/>
-              <a:t>）</a:t>
-            </a:r>
-            <a:endParaRPr lang="en-US" altLang="zh-CN" dirty="0" smtClean="0"/>
-          </a:p>
-          <a:p>
-            <a:r>
-              <a:rPr lang="zh-CN" altLang="en-US" dirty="0" smtClean="0"/>
-              <a:t>贝叶斯优化（</a:t>
-            </a:r>
-            <a:r>
-              <a:rPr lang="en-US" altLang="zh-CN" dirty="0" smtClean="0"/>
-              <a:t>Bayesian optimization</a:t>
-            </a:r>
-            <a:r>
-              <a:rPr lang="zh-CN" altLang="en-US" dirty="0" smtClean="0"/>
-              <a:t>）</a:t>
-            </a:r>
-            <a:endParaRPr lang="en-US" altLang="zh-CN" dirty="0" smtClean="0"/>
-          </a:p>
-          <a:p>
-            <a:r>
-              <a:rPr lang="zh-CN" altLang="en-US" dirty="0" smtClean="0"/>
-              <a:t>基于梯度优化（</a:t>
-            </a:r>
-            <a:r>
-              <a:rPr lang="en-US" altLang="zh-CN" dirty="0" smtClean="0"/>
-              <a:t>Gradient-based optimization</a:t>
-            </a:r>
-            <a:r>
-              <a:rPr lang="zh-CN" altLang="en-US" dirty="0" smtClean="0"/>
-              <a:t>）</a:t>
-            </a:r>
-            <a:endParaRPr lang="en-US" altLang="zh-CN" dirty="0" smtClean="0"/>
-          </a:p>
-          <a:p>
-            <a:r>
-              <a:rPr lang="zh-CN" altLang="en-US" dirty="0" smtClean="0"/>
-              <a:t>进化优化（</a:t>
-            </a:r>
-            <a:r>
-              <a:rPr lang="en-US" altLang="zh-CN" dirty="0" smtClean="0"/>
-              <a:t>Evolutionary optimization</a:t>
-            </a:r>
-            <a:r>
-              <a:rPr lang="zh-CN" altLang="en-US" dirty="0" smtClean="0"/>
-              <a:t>）</a:t>
-            </a:r>
-            <a:endParaRPr lang="en-US" altLang="zh-CN" dirty="0" smtClean="0"/>
-          </a:p>
-          <a:p>
-            <a:r>
-              <a:rPr lang="zh-CN" altLang="en-US" dirty="0" smtClean="0"/>
-              <a:t>基于种群优化（</a:t>
-            </a:r>
-            <a:r>
-              <a:rPr lang="en-US" altLang="zh-CN" dirty="0" smtClean="0"/>
-              <a:t>Population-based optimization</a:t>
-            </a:r>
-            <a:r>
-              <a:rPr lang="zh-CN" altLang="en-US" dirty="0" smtClean="0"/>
-              <a:t>）</a:t>
-            </a:r>
-            <a:endParaRPr lang="en-US" altLang="zh-CN" dirty="0" smtClean="0"/>
-          </a:p>
-          <a:p>
-            <a:r>
-              <a:rPr lang="zh-CN" altLang="en-US" b="1" dirty="0" smtClean="0"/>
-              <a:t>人工手动调参（</a:t>
-            </a:r>
-            <a:r>
-              <a:rPr lang="en-US" altLang="zh-CN" b="1" dirty="0" smtClean="0"/>
-              <a:t>Manual</a:t>
-            </a:r>
-            <a:r>
-              <a:rPr lang="zh-CN" altLang="en-US" b="1" dirty="0" smtClean="0"/>
-              <a:t>）</a:t>
-            </a:r>
-            <a:endParaRPr lang="zh-CN" altLang="en-US" b="1" dirty="0"/>
-          </a:p>
-        </p:txBody>
-      </p:sp>
-    </p:spTree>
-    <p:extLst>
-      <p:ext uri="{BB962C8B-B14F-4D97-AF65-F5344CB8AC3E}">
-        <p14:creationId xmlns:p14="http://schemas.microsoft.com/office/powerpoint/2010/main" val="2726335630"/>
+        <p14:creationId xmlns:p14="http://schemas.microsoft.com/office/powerpoint/2010/main" val="3346405701"/>
       </p:ext>
     </p:extLst>
   </p:cSld>
@@ -3835,7 +3722,7 @@
           <a:p>
             <a:r>
               <a:rPr lang="zh-CN" altLang="en-US" dirty="0" smtClean="0"/>
-              <a:t>训练过程</a:t>
+              <a:t>混合使用各种图像增强方法</a:t>
             </a:r>
             <a:endParaRPr lang="zh-CN" altLang="en-US" dirty="0"/>
           </a:p>
@@ -3843,7 +3730,7 @@
       </p:sp>
       <p:pic>
         <p:nvPicPr>
-          <p:cNvPr id="4" name="图片 3"/>
+          <p:cNvPr id="3" name="图片 2"/>
           <p:cNvPicPr>
             <a:picLocks noChangeAspect="1"/>
           </p:cNvPicPr>
@@ -3863,119 +3750,18 @@
         </p:blipFill>
         <p:spPr>
           <a:xfrm>
-            <a:off x="3427757" y="953219"/>
-            <a:ext cx="5514286" cy="5752381"/>
+            <a:off x="3378200" y="1231900"/>
+            <a:ext cx="5435600" cy="5435600"/>
           </a:xfrm>
           <a:prstGeom prst="rect">
             <a:avLst/>
           </a:prstGeom>
         </p:spPr>
       </p:pic>
-      <p:sp>
-        <p:nvSpPr>
-          <p:cNvPr id="5" name="矩形 4"/>
-          <p:cNvSpPr/>
-          <p:nvPr/>
-        </p:nvSpPr>
-        <p:spPr>
-          <a:xfrm>
-            <a:off x="3427757" y="953219"/>
-            <a:ext cx="5514286" cy="215181"/>
-          </a:xfrm>
-          <a:prstGeom prst="rect">
-            <a:avLst/>
-          </a:prstGeom>
-          <a:noFill/>
-          <a:ln w="38100">
-            <a:solidFill>
-              <a:srgbClr val="FF0000"/>
-            </a:solidFill>
-          </a:ln>
-        </p:spPr>
-        <p:style>
-          <a:lnRef idx="2">
-            <a:schemeClr val="accent1">
-              <a:shade val="50000"/>
-            </a:schemeClr>
-          </a:lnRef>
-          <a:fillRef idx="1">
-            <a:schemeClr val="accent1"/>
-          </a:fillRef>
-          <a:effectRef idx="0">
-            <a:schemeClr val="accent1"/>
-          </a:effectRef>
-          <a:fontRef idx="minor">
-            <a:schemeClr val="lt1"/>
-          </a:fontRef>
-        </p:style>
-        <p:txBody>
-          <a:bodyPr rtlCol="0" anchor="ctr"/>
-          <a:lstStyle/>
-          <a:p>
-            <a:pPr algn="ctr"/>
-            <a:endParaRPr lang="zh-CN" altLang="en-US"/>
-          </a:p>
-        </p:txBody>
-      </p:sp>
-      <p:sp>
-        <p:nvSpPr>
-          <p:cNvPr id="6" name="矩形 5"/>
-          <p:cNvSpPr/>
-          <p:nvPr/>
-        </p:nvSpPr>
-        <p:spPr>
-          <a:xfrm>
-            <a:off x="3427757" y="6019800"/>
-            <a:ext cx="5514286" cy="685800"/>
-          </a:xfrm>
-          <a:prstGeom prst="rect">
-            <a:avLst/>
-          </a:prstGeom>
-          <a:solidFill>
-            <a:srgbClr val="A9D18E">
-              <a:alpha val="43922"/>
-            </a:srgbClr>
-          </a:solidFill>
-          <a:ln w="38100">
-            <a:solidFill>
-              <a:srgbClr val="00B050"/>
-            </a:solidFill>
-          </a:ln>
-        </p:spPr>
-        <p:style>
-          <a:lnRef idx="2">
-            <a:schemeClr val="accent1">
-              <a:shade val="50000"/>
-            </a:schemeClr>
-          </a:lnRef>
-          <a:fillRef idx="1">
-            <a:schemeClr val="accent1"/>
-          </a:fillRef>
-          <a:effectRef idx="0">
-            <a:schemeClr val="accent1"/>
-          </a:effectRef>
-          <a:fontRef idx="minor">
-            <a:schemeClr val="lt1"/>
-          </a:fontRef>
-        </p:style>
-        <p:txBody>
-          <a:bodyPr rot="0" spcFirstLastPara="0" vertOverflow="overflow" horzOverflow="overflow" vert="horz" wrap="square" lIns="91440" tIns="45720" rIns="91440" bIns="45720" numCol="1" spcCol="0" rtlCol="0" fromWordArt="0" anchor="ctr" anchorCtr="0" forceAA="0" compatLnSpc="1">
-            <a:prstTxWarp prst="textNoShape">
-              <a:avLst/>
-            </a:prstTxWarp>
-            <a:noAutofit/>
-          </a:bodyPr>
-          <a:lstStyle/>
-          <a:p>
-            <a:pPr algn="ctr"/>
-            <a:endParaRPr lang="zh-CN" altLang="en-US"/>
-          </a:p>
-        </p:txBody>
-      </p:sp>
     </p:spTree>
     <p:extLst>
       <p:ext uri="{BB962C8B-B14F-4D97-AF65-F5344CB8AC3E}">
-        <p14:creationId xmlns:p14="http://schemas.microsoft.com/office/powerpoint/2010/main" val="4039218647"/>
+        <p14:creationId xmlns:p14="http://schemas.microsoft.com/office/powerpoint/2010/main" val="2090873546"/>
       </p:ext>
     </p:extLst>
   </p:cSld>
@@ -4009,6 +3795,29 @@
           <a:chExt cx="0" cy="0"/>
         </a:xfrm>
       </p:grpSpPr>
+      <p:sp>
+        <p:nvSpPr>
+          <p:cNvPr id="2" name="标题 1"/>
+          <p:cNvSpPr>
+            <a:spLocks noGrp="1"/>
+          </p:cNvSpPr>
+          <p:nvPr>
+            <p:ph type="title"/>
+          </p:nvPr>
+        </p:nvSpPr>
+        <p:spPr/>
+        <p:txBody>
+          <a:bodyPr/>
+          <a:lstStyle/>
+          <a:p>
+            <a:r>
+              <a:rPr lang="zh-CN" altLang="en-US" dirty="0" smtClean="0"/>
+              <a:t>使用向量化思想提速</a:t>
+            </a:r>
+            <a:endParaRPr lang="zh-CN" altLang="en-US" dirty="0"/>
+          </a:p>
+        </p:txBody>
+      </p:sp>
       <p:pic>
         <p:nvPicPr>
           <p:cNvPr id="4" name="图片 3"/>
@@ -4031,129 +3840,135 @@
         </p:blipFill>
         <p:spPr>
           <a:xfrm>
-            <a:off x="0" y="1704114"/>
-            <a:ext cx="5742584" cy="3921986"/>
+            <a:off x="838200" y="1054099"/>
+            <a:ext cx="4965700" cy="5658341"/>
           </a:xfrm>
           <a:prstGeom prst="rect">
             <a:avLst/>
           </a:prstGeom>
         </p:spPr>
       </p:pic>
-      <p:sp>
-        <p:nvSpPr>
-          <p:cNvPr id="2" name="标题 1"/>
-          <p:cNvSpPr>
-            <a:spLocks noGrp="1"/>
-          </p:cNvSpPr>
-          <p:nvPr>
-            <p:ph type="title"/>
-          </p:nvPr>
-        </p:nvSpPr>
-        <p:spPr/>
-        <p:txBody>
-          <a:bodyPr/>
-          <a:lstStyle/>
-          <a:p>
-            <a:r>
-              <a:rPr lang="zh-CN" altLang="en-US" dirty="0" smtClean="0"/>
-              <a:t>训练结果及分析</a:t>
-            </a:r>
-            <a:endParaRPr lang="zh-CN" altLang="en-US" dirty="0"/>
-          </a:p>
-        </p:txBody>
-      </p:sp>
-      <p:sp>
-        <p:nvSpPr>
-          <p:cNvPr id="3" name="内容占位符 2"/>
-          <p:cNvSpPr>
-            <a:spLocks noGrp="1"/>
-          </p:cNvSpPr>
-          <p:nvPr>
-            <p:ph idx="1"/>
-          </p:nvPr>
-        </p:nvSpPr>
-        <p:spPr>
-          <a:xfrm>
-            <a:off x="5346700" y="1800225"/>
-            <a:ext cx="6565900" cy="4351338"/>
-          </a:xfrm>
-        </p:spPr>
-        <p:txBody>
-          <a:bodyPr>
-            <a:normAutofit/>
+      <p:pic>
+        <p:nvPicPr>
+          <p:cNvPr id="5" name="图片 4"/>
+          <p:cNvPicPr>
+            <a:picLocks noChangeAspect="1"/>
+          </p:cNvPicPr>
+          <p:nvPr/>
+        </p:nvPicPr>
+        <p:blipFill>
+          <a:blip r:embed="rId3">
+            <a:extLst>
+              <a:ext uri="{28A0092B-C50C-407E-A947-70E740481C1C}">
+                <a14:useLocalDpi xmlns:a14="http://schemas.microsoft.com/office/drawing/2010/main" val="0"/>
+              </a:ext>
+            </a:extLst>
+          </a:blip>
+          <a:stretch>
+            <a:fillRect/>
+          </a:stretch>
+        </p:blipFill>
+        <p:spPr>
+          <a:xfrm>
+            <a:off x="6295852" y="2187574"/>
+            <a:ext cx="5629861" cy="3803960"/>
+          </a:xfrm>
+          <a:prstGeom prst="rect">
+            <a:avLst/>
+          </a:prstGeom>
+        </p:spPr>
+      </p:pic>
+      <p:sp>
+        <p:nvSpPr>
+          <p:cNvPr id="6" name="文本框 5"/>
+          <p:cNvSpPr txBox="1"/>
+          <p:nvPr/>
+        </p:nvSpPr>
+        <p:spPr>
+          <a:xfrm>
+            <a:off x="6295852" y="1054099"/>
+            <a:ext cx="2282997" cy="874407"/>
+          </a:xfrm>
+          <a:prstGeom prst="rect">
+            <a:avLst/>
+          </a:prstGeom>
+          <a:noFill/>
+        </p:spPr>
+        <p:txBody>
+          <a:bodyPr wrap="none" rtlCol="0">
+            <a:spAutoFit/>
           </a:bodyPr>
           <a:lstStyle/>
           <a:p>
-            <a:r>
-              <a:rPr lang="zh-CN" altLang="en-US" sz="2000" dirty="0" smtClean="0"/>
-              <a:t>第 </a:t>
-            </a:r>
-            <a:r>
-              <a:rPr lang="en-US" altLang="zh-CN" sz="2000" dirty="0" smtClean="0"/>
-              <a:t>1 </a:t>
-            </a:r>
-            <a:r>
-              <a:rPr lang="zh-CN" altLang="en-US" sz="2000" dirty="0" smtClean="0"/>
-              <a:t>次迭代就已经有了较高的准确率（约为</a:t>
-            </a:r>
-            <a:r>
-              <a:rPr lang="en-US" altLang="zh-CN" sz="2000" dirty="0" smtClean="0"/>
-              <a:t>88%</a:t>
-            </a:r>
-            <a:r>
-              <a:rPr lang="zh-CN" altLang="en-US" sz="2000" dirty="0" smtClean="0"/>
-              <a:t>），说明生成的训练集数量充足，经过一次迭代就已经使网络的权重达到较佳的状态</a:t>
-            </a:r>
-          </a:p>
-          <a:p>
-            <a:r>
-              <a:rPr lang="zh-CN" altLang="en-US" sz="2000" dirty="0" smtClean="0"/>
-              <a:t>前几次迭代中，准确率出现了微小的波动，说明此时网络还未到达较为稳定的状态，部分训练数据对网络的泛化造成了一定的影响</a:t>
-            </a:r>
-          </a:p>
-          <a:p>
-            <a:r>
-              <a:rPr lang="zh-CN" altLang="en-US" sz="2000" dirty="0" smtClean="0"/>
-              <a:t>在几次迭代以后，准确率稳步上升，并且最终到达 </a:t>
-            </a:r>
-            <a:r>
-              <a:rPr lang="en-US" altLang="zh-CN" sz="2000" dirty="0" smtClean="0"/>
-              <a:t>100%</a:t>
-            </a:r>
-            <a:r>
-              <a:rPr lang="zh-CN" altLang="en-US" sz="2000" dirty="0" smtClean="0"/>
-              <a:t>，说明网络训练状况优良，训练算法较好</a:t>
-            </a:r>
-          </a:p>
-          <a:p>
-            <a:r>
-              <a:rPr lang="zh-CN" altLang="en-US" sz="2000" dirty="0" smtClean="0"/>
-              <a:t>大约 </a:t>
-            </a:r>
-            <a:r>
-              <a:rPr lang="en-US" altLang="zh-CN" sz="2000" dirty="0" smtClean="0"/>
-              <a:t>25 </a:t>
-            </a:r>
-            <a:r>
-              <a:rPr lang="zh-CN" altLang="en-US" sz="2000" dirty="0" smtClean="0"/>
-              <a:t>次左右的迭代，就已经能达到 </a:t>
-            </a:r>
-            <a:r>
-              <a:rPr lang="en-US" altLang="zh-CN" sz="2000" dirty="0" smtClean="0"/>
-              <a:t>100% </a:t>
-            </a:r>
-            <a:r>
-              <a:rPr lang="zh-CN" altLang="en-US" sz="2000" dirty="0" smtClean="0"/>
-              <a:t>的准确率，并且保持稳定，表明我们的学习率选取得较为合适，使得权重收敛状况较好，也从侧面体现了轻量级网络训练较快的优点</a:t>
-            </a:r>
-            <a:endParaRPr lang="zh-CN" altLang="en-US" sz="2000" dirty="0"/>
+            <a:pPr>
+              <a:lnSpc>
+                <a:spcPct val="150000"/>
+              </a:lnSpc>
+            </a:pPr>
+            <a:r>
+              <a:rPr lang="zh-CN" altLang="en-US" dirty="0" smtClean="0">
+                <a:latin typeface="微软雅黑" panose="020B0503020204020204" pitchFamily="34" charset="-122"/>
+                <a:ea typeface="微软雅黑" panose="020B0503020204020204" pitchFamily="34" charset="-122"/>
+              </a:rPr>
+              <a:t>小网络：</a:t>
+            </a:r>
+            <a:r>
+              <a:rPr lang="en-US" altLang="zh-CN" dirty="0" smtClean="0">
+                <a:latin typeface="微软雅黑" panose="020B0503020204020204" pitchFamily="34" charset="-122"/>
+                <a:ea typeface="微软雅黑" panose="020B0503020204020204" pitchFamily="34" charset="-122"/>
+              </a:rPr>
+              <a:t>~10</a:t>
+            </a:r>
+            <a:r>
+              <a:rPr lang="zh-CN" altLang="en-US" dirty="0" smtClean="0">
+                <a:latin typeface="微软雅黑" panose="020B0503020204020204" pitchFamily="34" charset="-122"/>
+                <a:ea typeface="微软雅黑" panose="020B0503020204020204" pitchFamily="34" charset="-122"/>
+              </a:rPr>
+              <a:t>倍</a:t>
+            </a:r>
+            <a:endParaRPr lang="en-US" altLang="zh-CN" dirty="0" smtClean="0">
+              <a:latin typeface="微软雅黑" panose="020B0503020204020204" pitchFamily="34" charset="-122"/>
+              <a:ea typeface="微软雅黑" panose="020B0503020204020204" pitchFamily="34" charset="-122"/>
+            </a:endParaRPr>
+          </a:p>
+          <a:p>
+            <a:pPr>
+              <a:lnSpc>
+                <a:spcPct val="150000"/>
+              </a:lnSpc>
+            </a:pPr>
+            <a:r>
+              <a:rPr lang="zh-CN" altLang="en-US" dirty="0" smtClean="0">
+                <a:latin typeface="微软雅黑" panose="020B0503020204020204" pitchFamily="34" charset="-122"/>
+                <a:ea typeface="微软雅黑" panose="020B0503020204020204" pitchFamily="34" charset="-122"/>
+              </a:rPr>
+              <a:t>大网络：</a:t>
+            </a:r>
+            <a:r>
+              <a:rPr lang="en-US" altLang="zh-CN" dirty="0" smtClean="0">
+                <a:latin typeface="微软雅黑" panose="020B0503020204020204" pitchFamily="34" charset="-122"/>
+                <a:ea typeface="微软雅黑" panose="020B0503020204020204" pitchFamily="34" charset="-122"/>
+              </a:rPr>
+              <a:t>~10-100</a:t>
+            </a:r>
+            <a:r>
+              <a:rPr lang="zh-CN" altLang="en-US" dirty="0">
+                <a:latin typeface="微软雅黑" panose="020B0503020204020204" pitchFamily="34" charset="-122"/>
+                <a:ea typeface="微软雅黑" panose="020B0503020204020204" pitchFamily="34" charset="-122"/>
+              </a:rPr>
+              <a:t>倍</a:t>
+            </a:r>
+            <a:endParaRPr lang="zh-CN" altLang="en-US" dirty="0" smtClean="0">
+              <a:latin typeface="微软雅黑" panose="020B0503020204020204" pitchFamily="34" charset="-122"/>
+              <a:ea typeface="微软雅黑" panose="020B0503020204020204" pitchFamily="34" charset="-122"/>
+            </a:endParaRPr>
           </a:p>
         </p:txBody>
       </p:sp>
     </p:spTree>
     <p:extLst>
       <p:ext uri="{BB962C8B-B14F-4D97-AF65-F5344CB8AC3E}">
-        <p14:creationId xmlns:p14="http://schemas.microsoft.com/office/powerpoint/2010/main" val="3348038777"/>
+        <p14:creationId xmlns:p14="http://schemas.microsoft.com/office/powerpoint/2010/main" val="2252875958"/>
       </p:ext>
     </p:extLst>
   </p:cSld>
@@ -4204,7 +4019,15 @@
           <a:p>
             <a:r>
               <a:rPr lang="zh-CN" altLang="en-US" dirty="0" smtClean="0"/>
-              <a:t>测试结果</a:t>
+              <a:t>使用 </a:t>
+            </a:r>
+            <a:r>
+              <a:rPr lang="en-US" altLang="zh-CN" dirty="0" smtClean="0"/>
+              <a:t>pickle </a:t>
+            </a:r>
+            <a:r>
+              <a:rPr lang="zh-CN" altLang="en-US" dirty="0" smtClean="0"/>
+              <a:t>库导入导出变量</a:t>
             </a:r>
             <a:endParaRPr lang="zh-CN" altLang="en-US" dirty="0"/>
           </a:p>
@@ -4232,137 +4055,168 @@
         </p:blipFill>
         <p:spPr>
           <a:xfrm>
-            <a:off x="736600" y="2735451"/>
-            <a:ext cx="4305300" cy="1387095"/>
+            <a:off x="438747" y="1819854"/>
+            <a:ext cx="5070003" cy="1080000"/>
           </a:xfrm>
           <a:prstGeom prst="rect">
             <a:avLst/>
           </a:prstGeom>
         </p:spPr>
       </p:pic>
-      <p:sp>
-        <p:nvSpPr>
-          <p:cNvPr id="5" name="文本框 4"/>
-          <p:cNvSpPr txBox="1"/>
+      <p:pic>
+        <p:nvPicPr>
+          <p:cNvPr id="5" name="图片 4"/>
+          <p:cNvPicPr>
+            <a:picLocks noChangeAspect="1"/>
+          </p:cNvPicPr>
           <p:nvPr/>
-        </p:nvSpPr>
-        <p:spPr>
-          <a:xfrm>
-            <a:off x="5880100" y="2305615"/>
-            <a:ext cx="6100686" cy="2246769"/>
+        </p:nvPicPr>
+        <p:blipFill>
+          <a:blip r:embed="rId3">
+            <a:extLst>
+              <a:ext uri="{28A0092B-C50C-407E-A947-70E740481C1C}">
+                <a14:useLocalDpi xmlns:a14="http://schemas.microsoft.com/office/drawing/2010/main" val="0"/>
+              </a:ext>
+            </a:extLst>
+          </a:blip>
+          <a:stretch>
+            <a:fillRect/>
+          </a:stretch>
+        </p:blipFill>
+        <p:spPr>
+          <a:xfrm>
+            <a:off x="438747" y="3334288"/>
+            <a:ext cx="5276248" cy="1008000"/>
           </a:xfrm>
           <a:prstGeom prst="rect">
             <a:avLst/>
           </a:prstGeom>
-          <a:noFill/>
-        </p:spPr>
-        <p:txBody>
-          <a:bodyPr wrap="square" rtlCol="0">
-            <a:spAutoFit/>
-          </a:bodyPr>
-          <a:lstStyle/>
-          <a:p>
-            <a:pPr marL="285750" indent="-285750">
-              <a:buFont typeface="Arial" panose="020B0604020202020204" pitchFamily="34" charset="0"/>
-              <a:buChar char="•"/>
-            </a:pPr>
-            <a:r>
-              <a:rPr lang="zh-CN" altLang="en-US" sz="2000" dirty="0">
-                <a:latin typeface="微软雅黑" panose="020B0503020204020204" pitchFamily="34" charset="-122"/>
-                <a:ea typeface="微软雅黑" panose="020B0503020204020204" pitchFamily="34" charset="-122"/>
-              </a:rPr>
-              <a:t>即使训练集和测试集并不相同，但是我们的网络还是</a:t>
-            </a:r>
-            <a:r>
-              <a:rPr lang="zh-CN" altLang="en-US" sz="2000" dirty="0" smtClean="0">
-                <a:latin typeface="微软雅黑" panose="020B0503020204020204" pitchFamily="34" charset="-122"/>
-                <a:ea typeface="微软雅黑" panose="020B0503020204020204" pitchFamily="34" charset="-122"/>
-              </a:rPr>
-              <a:t>能达到 </a:t>
-            </a:r>
-            <a:r>
-              <a:rPr lang="en-US" altLang="zh-CN" sz="2000" dirty="0">
-                <a:latin typeface="微软雅黑" panose="020B0503020204020204" pitchFamily="34" charset="-122"/>
-                <a:ea typeface="微软雅黑" panose="020B0503020204020204" pitchFamily="34" charset="-122"/>
-              </a:rPr>
-              <a:t>100% </a:t>
-            </a:r>
-            <a:r>
-              <a:rPr lang="zh-CN" altLang="en-US" sz="2000" dirty="0">
-                <a:latin typeface="微软雅黑" panose="020B0503020204020204" pitchFamily="34" charset="-122"/>
-                <a:ea typeface="微软雅黑" panose="020B0503020204020204" pitchFamily="34" charset="-122"/>
-              </a:rPr>
-              <a:t>的准确率，也就是说，网络依旧能识别出不同类别图像的特征，体现了该</a:t>
-            </a:r>
-            <a:r>
-              <a:rPr lang="zh-CN" altLang="en-US" sz="2000" dirty="0" smtClean="0">
-                <a:latin typeface="微软雅黑" panose="020B0503020204020204" pitchFamily="34" charset="-122"/>
-                <a:ea typeface="微软雅黑" panose="020B0503020204020204" pitchFamily="34" charset="-122"/>
-              </a:rPr>
-              <a:t>网络模型</a:t>
-            </a:r>
-            <a:r>
-              <a:rPr lang="zh-CN" altLang="en-US" sz="2000" dirty="0">
-                <a:latin typeface="微软雅黑" panose="020B0503020204020204" pitchFamily="34" charset="-122"/>
-                <a:ea typeface="微软雅黑" panose="020B0503020204020204" pitchFamily="34" charset="-122"/>
-              </a:rPr>
-              <a:t>较好的</a:t>
-            </a:r>
-            <a:r>
-              <a:rPr lang="zh-CN" altLang="en-US" sz="2000" dirty="0" smtClean="0">
-                <a:latin typeface="微软雅黑" panose="020B0503020204020204" pitchFamily="34" charset="-122"/>
-                <a:ea typeface="微软雅黑" panose="020B0503020204020204" pitchFamily="34" charset="-122"/>
-              </a:rPr>
-              <a:t>通用性。</a:t>
-            </a:r>
-            <a:endParaRPr lang="en-US" altLang="zh-CN" sz="2000" dirty="0" smtClean="0">
-              <a:latin typeface="微软雅黑" panose="020B0503020204020204" pitchFamily="34" charset="-122"/>
-              <a:ea typeface="微软雅黑" panose="020B0503020204020204" pitchFamily="34" charset="-122"/>
-            </a:endParaRPr>
-          </a:p>
-          <a:p>
-            <a:pPr marL="285750" indent="-285750">
-              <a:buFont typeface="Arial" panose="020B0604020202020204" pitchFamily="34" charset="0"/>
-              <a:buChar char="•"/>
-            </a:pPr>
-            <a:endParaRPr lang="en-US" altLang="zh-CN" sz="2000" dirty="0" smtClean="0">
-              <a:latin typeface="微软雅黑" panose="020B0503020204020204" pitchFamily="34" charset="-122"/>
-              <a:ea typeface="微软雅黑" panose="020B0503020204020204" pitchFamily="34" charset="-122"/>
-            </a:endParaRPr>
-          </a:p>
-          <a:p>
-            <a:pPr marL="285750" indent="-285750">
-              <a:buFont typeface="Arial" panose="020B0604020202020204" pitchFamily="34" charset="0"/>
-              <a:buChar char="•"/>
-            </a:pPr>
-            <a:r>
-              <a:rPr lang="zh-CN" altLang="en-US" sz="2000" dirty="0" smtClean="0">
-                <a:latin typeface="微软雅黑" panose="020B0503020204020204" pitchFamily="34" charset="-122"/>
-                <a:ea typeface="微软雅黑" panose="020B0503020204020204" pitchFamily="34" charset="-122"/>
-              </a:rPr>
-              <a:t>分类</a:t>
-            </a:r>
-            <a:r>
-              <a:rPr lang="zh-CN" altLang="en-US" sz="2000" dirty="0">
-                <a:latin typeface="微软雅黑" panose="020B0503020204020204" pitchFamily="34" charset="-122"/>
-                <a:ea typeface="微软雅黑" panose="020B0503020204020204" pitchFamily="34" charset="-122"/>
-              </a:rPr>
-              <a:t>速度也很快，说明我们的网络性能较好，可以在短时间内处理大量的数据。</a:t>
-            </a:r>
-            <a:r>
-              <a:rPr lang="zh-CN" altLang="en-US" sz="2000" dirty="0" smtClean="0">
-                <a:latin typeface="微软雅黑" panose="020B0503020204020204" pitchFamily="34" charset="-122"/>
-                <a:ea typeface="微软雅黑" panose="020B0503020204020204" pitchFamily="34" charset="-122"/>
-              </a:rPr>
-              <a:t> </a:t>
-            </a:r>
-          </a:p>
-        </p:txBody>
-      </p:sp>
+        </p:spPr>
+      </p:pic>
+      <p:pic>
+        <p:nvPicPr>
+          <p:cNvPr id="6" name="图片 5"/>
+          <p:cNvPicPr>
+            <a:picLocks noChangeAspect="1"/>
+          </p:cNvPicPr>
+          <p:nvPr/>
+        </p:nvPicPr>
+        <p:blipFill>
+          <a:blip r:embed="rId4">
+            <a:extLst>
+              <a:ext uri="{28A0092B-C50C-407E-A947-70E740481C1C}">
+                <a14:useLocalDpi xmlns:a14="http://schemas.microsoft.com/office/drawing/2010/main" val="0"/>
+              </a:ext>
+            </a:extLst>
+          </a:blip>
+          <a:stretch>
+            <a:fillRect/>
+          </a:stretch>
+        </p:blipFill>
+        <p:spPr>
+          <a:xfrm>
+            <a:off x="502054" y="4776722"/>
+            <a:ext cx="5545094" cy="936000"/>
+          </a:xfrm>
+          <a:prstGeom prst="rect">
+            <a:avLst/>
+          </a:prstGeom>
+        </p:spPr>
+      </p:pic>
+      <p:pic>
+        <p:nvPicPr>
+          <p:cNvPr id="7" name="图片 6"/>
+          <p:cNvPicPr>
+            <a:picLocks noChangeAspect="1"/>
+          </p:cNvPicPr>
+          <p:nvPr/>
+        </p:nvPicPr>
+        <p:blipFill>
+          <a:blip r:embed="rId5">
+            <a:extLst>
+              <a:ext uri="{28A0092B-C50C-407E-A947-70E740481C1C}">
+                <a14:useLocalDpi xmlns:a14="http://schemas.microsoft.com/office/drawing/2010/main" val="0"/>
+              </a:ext>
+            </a:extLst>
+          </a:blip>
+          <a:stretch>
+            <a:fillRect/>
+          </a:stretch>
+        </p:blipFill>
+        <p:spPr>
+          <a:xfrm>
+            <a:off x="6096000" y="1819854"/>
+            <a:ext cx="5748389" cy="1080000"/>
+          </a:xfrm>
+          <a:prstGeom prst="rect">
+            <a:avLst/>
+          </a:prstGeom>
+        </p:spPr>
+      </p:pic>
+      <p:pic>
+        <p:nvPicPr>
+          <p:cNvPr id="9" name="图片 8"/>
+          <p:cNvPicPr>
+            <a:picLocks noChangeAspect="1"/>
+          </p:cNvPicPr>
+          <p:nvPr/>
+        </p:nvPicPr>
+        <p:blipFill>
+          <a:blip r:embed="rId6">
+            <a:extLst>
+              <a:ext uri="{28A0092B-C50C-407E-A947-70E740481C1C}">
+                <a14:useLocalDpi xmlns:a14="http://schemas.microsoft.com/office/drawing/2010/main" val="0"/>
+              </a:ext>
+            </a:extLst>
+          </a:blip>
+          <a:stretch>
+            <a:fillRect/>
+          </a:stretch>
+        </p:blipFill>
+        <p:spPr>
+          <a:xfrm>
+            <a:off x="6167627" y="4776722"/>
+            <a:ext cx="5645715" cy="936000"/>
+          </a:xfrm>
+          <a:prstGeom prst="rect">
+            <a:avLst/>
+          </a:prstGeom>
+        </p:spPr>
+      </p:pic>
+      <p:pic>
+        <p:nvPicPr>
+          <p:cNvPr id="3" name="图片 2"/>
+          <p:cNvPicPr>
+            <a:picLocks noChangeAspect="1"/>
+          </p:cNvPicPr>
+          <p:nvPr/>
+        </p:nvPicPr>
+        <p:blipFill>
+          <a:blip r:embed="rId7">
+            <a:extLst>
+              <a:ext uri="{28A0092B-C50C-407E-A947-70E740481C1C}">
+                <a14:useLocalDpi xmlns:a14="http://schemas.microsoft.com/office/drawing/2010/main" val="0"/>
+              </a:ext>
+            </a:extLst>
+          </a:blip>
+          <a:stretch>
+            <a:fillRect/>
+          </a:stretch>
+        </p:blipFill>
+        <p:spPr>
+          <a:xfrm>
+            <a:off x="6096000" y="3334288"/>
+            <a:ext cx="5622748" cy="1008000"/>
+          </a:xfrm>
+          <a:prstGeom prst="rect">
+            <a:avLst/>
+          </a:prstGeom>
+        </p:spPr>
+      </p:pic>
     </p:spTree>
     <p:extLst>
       <p:ext uri="{BB962C8B-B14F-4D97-AF65-F5344CB8AC3E}">
-        <p14:creationId xmlns:p14="http://schemas.microsoft.com/office/powerpoint/2010/main" val="2508279034"/>
+        <p14:creationId xmlns:p14="http://schemas.microsoft.com/office/powerpoint/2010/main" val="861207035"/>
       </p:ext>
     </p:extLst>
   </p:cSld>
@@ -4413,7 +4267,7 @@
           <a:p>
             <a:r>
               <a:rPr lang="zh-CN" altLang="en-US" dirty="0" smtClean="0"/>
-              <a:t>参考资料</a:t>
+              <a:t>超参数优化</a:t>
             </a:r>
             <a:endParaRPr lang="zh-CN" altLang="en-US" dirty="0"/>
           </a:p>
@@ -4429,155 +4283,121 @@
             <p:ph idx="1"/>
           </p:nvPr>
         </p:nvSpPr>
-        <p:spPr>
-          <a:xfrm>
-            <a:off x="838200" y="1825625"/>
-            <a:ext cx="10629900" cy="4351338"/>
-          </a:xfrm>
-        </p:spPr>
-        <p:txBody>
-          <a:bodyPr>
-            <a:noAutofit/>
-          </a:bodyPr>
-          <a:lstStyle/>
-          <a:p>
-            <a:pPr marL="342900" indent="-342900">
-              <a:buFont typeface="+mj-lt"/>
-              <a:buAutoNum type="arabicPeriod"/>
-            </a:pPr>
-            <a:r>
-              <a:rPr lang="en-US" altLang="zh-CN" sz="1800" dirty="0" smtClean="0">
-                <a:latin typeface="Times New Roman" panose="02020603050405020304" pitchFamily="18" charset="0"/>
-                <a:cs typeface="Times New Roman" panose="02020603050405020304" pitchFamily="18" charset="0"/>
-              </a:rPr>
-              <a:t>Wikipedia contributors. (2019, May 29). Artificial neural network. In Wikipedia, The Free Encyclopedia. Retrieved 18:24, May 30, 2019, from https://en.wikipedia.org/w/index.php?title=Artificial_neural_network&amp;oldid=899409597</a:t>
-            </a:r>
-          </a:p>
-          <a:p>
-            <a:pPr marL="342900" indent="-342900">
-              <a:buFont typeface="+mj-lt"/>
-              <a:buAutoNum type="arabicPeriod"/>
-            </a:pPr>
-            <a:r>
-              <a:rPr lang="en-US" altLang="zh-CN" sz="1800" dirty="0" smtClean="0">
-                <a:latin typeface="Times New Roman" panose="02020603050405020304" pitchFamily="18" charset="0"/>
-                <a:cs typeface="Times New Roman" panose="02020603050405020304" pitchFamily="18" charset="0"/>
-              </a:rPr>
-              <a:t>Wikipedia contributors. (2019, May 8). </a:t>
-            </a:r>
-            <a:r>
-              <a:rPr lang="en-US" altLang="zh-CN" sz="1800" dirty="0" err="1" smtClean="0">
-                <a:latin typeface="Times New Roman" panose="02020603050405020304" pitchFamily="18" charset="0"/>
-                <a:cs typeface="Times New Roman" panose="02020603050405020304" pitchFamily="18" charset="0"/>
-              </a:rPr>
-              <a:t>Hyperparameter</a:t>
-            </a:r>
-            <a:r>
-              <a:rPr lang="en-US" altLang="zh-CN" sz="1800" dirty="0" smtClean="0">
-                <a:latin typeface="Times New Roman" panose="02020603050405020304" pitchFamily="18" charset="0"/>
-                <a:cs typeface="Times New Roman" panose="02020603050405020304" pitchFamily="18" charset="0"/>
-              </a:rPr>
-              <a:t> optimization. In Wikipedia, The Free Encyclopedia. Retrieved 18:22, May 30, 2019, from https://en.wikipedia.org/w/index.php?title=Hyperparameter_optimization&amp;oldid=896193455</a:t>
-            </a:r>
-          </a:p>
-          <a:p>
-            <a:pPr marL="342900" indent="-342900">
-              <a:buFont typeface="+mj-lt"/>
-              <a:buAutoNum type="arabicPeriod"/>
-            </a:pPr>
-            <a:r>
-              <a:rPr lang="en-US" altLang="zh-CN" sz="1800" dirty="0" smtClean="0">
-                <a:latin typeface="Times New Roman" panose="02020603050405020304" pitchFamily="18" charset="0"/>
-                <a:cs typeface="Times New Roman" panose="02020603050405020304" pitchFamily="18" charset="0"/>
-              </a:rPr>
-              <a:t>Wikipedia contributors. (2019, May 19). Backpropagation. In Wikipedia, The Free Encyclopedia. Retrieved 18:23, May 30, 2019, from https://en.wikipedia.org/w/index.php?title=Backpropagation&amp;oldid=897855738</a:t>
-            </a:r>
-          </a:p>
-          <a:p>
-            <a:pPr marL="342900" indent="-342900">
-              <a:buFont typeface="+mj-lt"/>
-              <a:buAutoNum type="arabicPeriod"/>
-            </a:pPr>
-            <a:r>
-              <a:rPr lang="en-US" altLang="zh-CN" sz="1800" dirty="0" smtClean="0">
-                <a:latin typeface="Times New Roman" panose="02020603050405020304" pitchFamily="18" charset="0"/>
-                <a:cs typeface="Times New Roman" panose="02020603050405020304" pitchFamily="18" charset="0"/>
-              </a:rPr>
-              <a:t>Wikipedia contributors. (2019, May 25). Multilayer perceptron. In Wikipedia, The Free Encyclopedia. Retrieved 18:24, May 30, 2019, from https://en.wikipedia.org/w/index.php?title=Multilayer_perceptron&amp;oldid=898748424</a:t>
-            </a:r>
-          </a:p>
-          <a:p>
-            <a:pPr marL="342900" indent="-342900">
-              <a:buFont typeface="+mj-lt"/>
-              <a:buAutoNum type="arabicPeriod"/>
-            </a:pPr>
-            <a:r>
-              <a:rPr lang="en-US" altLang="zh-CN" sz="1800" dirty="0" err="1" smtClean="0">
-                <a:latin typeface="Times New Roman" panose="02020603050405020304" pitchFamily="18" charset="0"/>
-                <a:cs typeface="Times New Roman" panose="02020603050405020304" pitchFamily="18" charset="0"/>
-              </a:rPr>
-              <a:t>St´efan</a:t>
-            </a:r>
-            <a:r>
-              <a:rPr lang="en-US" altLang="zh-CN" sz="1800" dirty="0" smtClean="0">
-                <a:latin typeface="Times New Roman" panose="02020603050405020304" pitchFamily="18" charset="0"/>
-                <a:cs typeface="Times New Roman" panose="02020603050405020304" pitchFamily="18" charset="0"/>
-              </a:rPr>
-              <a:t> van der Walt, S. Chris Colbert and </a:t>
-            </a:r>
-            <a:r>
-              <a:rPr lang="en-US" altLang="zh-CN" sz="1800" dirty="0" err="1" smtClean="0">
-                <a:latin typeface="Times New Roman" panose="02020603050405020304" pitchFamily="18" charset="0"/>
-                <a:cs typeface="Times New Roman" panose="02020603050405020304" pitchFamily="18" charset="0"/>
-              </a:rPr>
-              <a:t>Ga¨el</a:t>
-            </a:r>
-            <a:r>
-              <a:rPr lang="en-US" altLang="zh-CN" sz="1800" dirty="0" smtClean="0">
-                <a:latin typeface="Times New Roman" panose="02020603050405020304" pitchFamily="18" charset="0"/>
-                <a:cs typeface="Times New Roman" panose="02020603050405020304" pitchFamily="18" charset="0"/>
-              </a:rPr>
-              <a:t> </a:t>
-            </a:r>
-            <a:r>
-              <a:rPr lang="en-US" altLang="zh-CN" sz="1800" dirty="0" err="1" smtClean="0">
-                <a:latin typeface="Times New Roman" panose="02020603050405020304" pitchFamily="18" charset="0"/>
-                <a:cs typeface="Times New Roman" panose="02020603050405020304" pitchFamily="18" charset="0"/>
-              </a:rPr>
-              <a:t>Varoquaux</a:t>
-            </a:r>
-            <a:r>
-              <a:rPr lang="en-US" altLang="zh-CN" sz="1800" dirty="0" smtClean="0">
-                <a:latin typeface="Times New Roman" panose="02020603050405020304" pitchFamily="18" charset="0"/>
-                <a:cs typeface="Times New Roman" panose="02020603050405020304" pitchFamily="18" charset="0"/>
-              </a:rPr>
-              <a:t>. The </a:t>
-            </a:r>
-            <a:r>
-              <a:rPr lang="en-US" altLang="zh-CN" sz="1800" dirty="0" err="1" smtClean="0">
-                <a:latin typeface="Times New Roman" panose="02020603050405020304" pitchFamily="18" charset="0"/>
-                <a:cs typeface="Times New Roman" panose="02020603050405020304" pitchFamily="18" charset="0"/>
-              </a:rPr>
-              <a:t>NumPy</a:t>
-            </a:r>
-            <a:r>
-              <a:rPr lang="en-US" altLang="zh-CN" sz="1800" dirty="0" smtClean="0">
-                <a:latin typeface="Times New Roman" panose="02020603050405020304" pitchFamily="18" charset="0"/>
-                <a:cs typeface="Times New Roman" panose="02020603050405020304" pitchFamily="18" charset="0"/>
-              </a:rPr>
-              <a:t> Array: A Structure for Efficient Numerical Computation, Computing in Science &amp; Engineering, 13, 22-30 (2011), DOI:10.1109/MCSE.2011.37</a:t>
-            </a:r>
-            <a:endParaRPr lang="zh-CN" altLang="en-US" sz="1800" dirty="0">
-              <a:latin typeface="Times New Roman" panose="02020603050405020304" pitchFamily="18" charset="0"/>
-              <a:cs typeface="Times New Roman" panose="02020603050405020304" pitchFamily="18" charset="0"/>
-            </a:endParaRPr>
+        <p:spPr/>
+        <p:txBody>
+          <a:bodyPr/>
+          <a:lstStyle/>
+          <a:p>
+            <a:r>
+              <a:rPr lang="zh-CN" altLang="en-US" dirty="0" smtClean="0"/>
+              <a:t>网格搜索（</a:t>
+            </a:r>
+            <a:r>
+              <a:rPr lang="en-US" altLang="zh-CN" dirty="0" smtClean="0"/>
+              <a:t>Grid search</a:t>
+            </a:r>
+            <a:r>
+              <a:rPr lang="zh-CN" altLang="en-US" dirty="0" smtClean="0"/>
+              <a:t>）</a:t>
+            </a:r>
+            <a:endParaRPr lang="en-US" altLang="zh-CN" dirty="0" smtClean="0"/>
+          </a:p>
+          <a:p>
+            <a:r>
+              <a:rPr lang="zh-CN" altLang="en-US" dirty="0" smtClean="0"/>
+              <a:t>随机搜索（</a:t>
+            </a:r>
+            <a:r>
+              <a:rPr lang="en-US" altLang="zh-CN" dirty="0" smtClean="0"/>
+              <a:t>Random search</a:t>
+            </a:r>
+            <a:r>
+              <a:rPr lang="zh-CN" altLang="en-US" dirty="0" smtClean="0"/>
+              <a:t>）</a:t>
+            </a:r>
+            <a:endParaRPr lang="en-US" altLang="zh-CN" dirty="0" smtClean="0"/>
+          </a:p>
+          <a:p>
+            <a:r>
+              <a:rPr lang="zh-CN" altLang="en-US" dirty="0" smtClean="0"/>
+              <a:t>贝叶斯优化（</a:t>
+            </a:r>
+            <a:r>
+              <a:rPr lang="en-US" altLang="zh-CN" dirty="0" smtClean="0"/>
+              <a:t>Bayesian optimization</a:t>
+            </a:r>
+            <a:r>
+              <a:rPr lang="zh-CN" altLang="en-US" dirty="0" smtClean="0"/>
+              <a:t>）</a:t>
+            </a:r>
+            <a:endParaRPr lang="en-US" altLang="zh-CN" dirty="0" smtClean="0"/>
+          </a:p>
+          <a:p>
+            <a:r>
+              <a:rPr lang="zh-CN" altLang="en-US" dirty="0" smtClean="0"/>
+              <a:t>基于梯度优化（</a:t>
+            </a:r>
+            <a:r>
+              <a:rPr lang="en-US" altLang="zh-CN" dirty="0" smtClean="0"/>
+              <a:t>Gradient-based optimization</a:t>
+            </a:r>
+            <a:r>
+              <a:rPr lang="zh-CN" altLang="en-US" dirty="0" smtClean="0"/>
+              <a:t>）</a:t>
+            </a:r>
+            <a:endParaRPr lang="en-US" altLang="zh-CN" dirty="0" smtClean="0"/>
+          </a:p>
+          <a:p>
+            <a:r>
+              <a:rPr lang="zh-CN" altLang="en-US" dirty="0" smtClean="0"/>
+              <a:t>进化优化（</a:t>
+            </a:r>
+            <a:r>
+              <a:rPr lang="en-US" altLang="zh-CN" dirty="0" smtClean="0"/>
+              <a:t>Evolutionary optimization</a:t>
+            </a:r>
+            <a:r>
+              <a:rPr lang="zh-CN" altLang="en-US" dirty="0" smtClean="0"/>
+              <a:t>）</a:t>
+            </a:r>
+            <a:endParaRPr lang="en-US" altLang="zh-CN" dirty="0" smtClean="0"/>
+          </a:p>
+          <a:p>
+            <a:r>
+              <a:rPr lang="zh-CN" altLang="en-US" dirty="0" smtClean="0"/>
+              <a:t>基于种群优化（</a:t>
+            </a:r>
+            <a:r>
+              <a:rPr lang="en-US" altLang="zh-CN" dirty="0" smtClean="0"/>
+              <a:t>Population-based optimization</a:t>
+            </a:r>
+            <a:r>
+              <a:rPr lang="zh-CN" altLang="en-US" dirty="0" smtClean="0"/>
+              <a:t>）</a:t>
+            </a:r>
+            <a:endParaRPr lang="en-US" altLang="zh-CN" dirty="0" smtClean="0"/>
+          </a:p>
+          <a:p>
+            <a:r>
+              <a:rPr lang="zh-CN" altLang="en-US" b="1" dirty="0" smtClean="0"/>
+              <a:t>人工手动调参（</a:t>
+            </a:r>
+            <a:r>
+              <a:rPr lang="en-US" altLang="zh-CN" b="1" dirty="0" smtClean="0"/>
+              <a:t>Manual</a:t>
+            </a:r>
+            <a:r>
+              <a:rPr lang="zh-CN" altLang="en-US" b="1" dirty="0" smtClean="0"/>
+              <a:t>）</a:t>
+            </a:r>
+            <a:endParaRPr lang="zh-CN" altLang="en-US" b="1" dirty="0"/>
           </a:p>
         </p:txBody>
       </p:sp>
     </p:spTree>
     <p:extLst>
       <p:ext uri="{BB962C8B-B14F-4D97-AF65-F5344CB8AC3E}">
-        <p14:creationId xmlns:p14="http://schemas.microsoft.com/office/powerpoint/2010/main" val="2445029701"/>
+        <p14:creationId xmlns:p14="http://schemas.microsoft.com/office/powerpoint/2010/main" val="2726335630"/>
       </p:ext>
     </p:extLst>
   </p:cSld>
@@ -4595,6 +4415,389 @@
 </file>
 
 <file path=ppt/slides/slide17.xml><?xml version="1.0" encoding="utf-8"?>
+<p:sld xmlns:a="http://schemas.openxmlformats.org/drawingml/2006/main" xmlns:r="http://schemas.openxmlformats.org/officeDocument/2006/relationships" xmlns:p="http://schemas.openxmlformats.org/presentationml/2006/main">
+  <p:cSld>
+    <p:spTree>
+      <p:nvGrpSpPr>
+        <p:cNvPr id="1" name=""/>
+        <p:cNvGrpSpPr/>
+        <p:nvPr/>
+      </p:nvGrpSpPr>
+      <p:grpSpPr>
+        <a:xfrm>
+          <a:off x="0" y="0"/>
+          <a:ext cx="0" cy="0"/>
+          <a:chOff x="0" y="0"/>
+          <a:chExt cx="0" cy="0"/>
+        </a:xfrm>
+      </p:grpSpPr>
+      <p:sp>
+        <p:nvSpPr>
+          <p:cNvPr id="2" name="标题 1"/>
+          <p:cNvSpPr>
+            <a:spLocks noGrp="1"/>
+          </p:cNvSpPr>
+          <p:nvPr>
+            <p:ph type="title"/>
+          </p:nvPr>
+        </p:nvSpPr>
+        <p:spPr/>
+        <p:txBody>
+          <a:bodyPr/>
+          <a:lstStyle/>
+          <a:p>
+            <a:r>
+              <a:rPr lang="en-US" altLang="zh-CN" dirty="0" smtClean="0"/>
+              <a:t>Python </a:t>
+            </a:r>
+            <a:r>
+              <a:rPr lang="zh-CN" altLang="en-US" dirty="0" smtClean="0"/>
+              <a:t>热门开源机器学习项目</a:t>
+            </a:r>
+            <a:endParaRPr lang="zh-CN" altLang="en-US" dirty="0"/>
+          </a:p>
+        </p:txBody>
+      </p:sp>
+      <p:pic>
+        <p:nvPicPr>
+          <p:cNvPr id="4" name="图片 3"/>
+          <p:cNvPicPr>
+            <a:picLocks noChangeAspect="1"/>
+          </p:cNvPicPr>
+          <p:nvPr/>
+        </p:nvPicPr>
+        <p:blipFill>
+          <a:blip r:embed="rId2">
+            <a:extLst>
+              <a:ext uri="{28A0092B-C50C-407E-A947-70E740481C1C}">
+                <a14:useLocalDpi xmlns:a14="http://schemas.microsoft.com/office/drawing/2010/main" val="0"/>
+              </a:ext>
+            </a:extLst>
+          </a:blip>
+          <a:stretch>
+            <a:fillRect/>
+          </a:stretch>
+        </p:blipFill>
+        <p:spPr>
+          <a:xfrm>
+            <a:off x="2353067" y="1167494"/>
+            <a:ext cx="7485865" cy="5576206"/>
+          </a:xfrm>
+          <a:prstGeom prst="rect">
+            <a:avLst/>
+          </a:prstGeom>
+        </p:spPr>
+      </p:pic>
+    </p:spTree>
+    <p:extLst>
+      <p:ext uri="{BB962C8B-B14F-4D97-AF65-F5344CB8AC3E}">
+        <p14:creationId xmlns:p14="http://schemas.microsoft.com/office/powerpoint/2010/main" val="1714723069"/>
+      </p:ext>
+    </p:extLst>
+  </p:cSld>
+  <p:clrMapOvr>
+    <a:masterClrMapping/>
+  </p:clrMapOvr>
+  <p:timing>
+    <p:tnLst>
+      <p:par>
+        <p:cTn id="1" dur="indefinite" restart="never" nodeType="tmRoot"/>
+      </p:par>
+    </p:tnLst>
+  </p:timing>
+</p:sld>
+</file>
+
+<file path=ppt/slides/slide18.xml><?xml version="1.0" encoding="utf-8"?>
+<p:sld xmlns:a="http://schemas.openxmlformats.org/drawingml/2006/main" xmlns:r="http://schemas.openxmlformats.org/officeDocument/2006/relationships" xmlns:p="http://schemas.openxmlformats.org/presentationml/2006/main">
+  <p:cSld>
+    <p:spTree>
+      <p:nvGrpSpPr>
+        <p:cNvPr id="1" name=""/>
+        <p:cNvGrpSpPr/>
+        <p:nvPr/>
+      </p:nvGrpSpPr>
+      <p:grpSpPr>
+        <a:xfrm>
+          <a:off x="0" y="0"/>
+          <a:ext cx="0" cy="0"/>
+          <a:chOff x="0" y="0"/>
+          <a:chExt cx="0" cy="0"/>
+        </a:xfrm>
+      </p:grpSpPr>
+      <p:sp>
+        <p:nvSpPr>
+          <p:cNvPr id="2" name="标题 1"/>
+          <p:cNvSpPr>
+            <a:spLocks noGrp="1"/>
+          </p:cNvSpPr>
+          <p:nvPr>
+            <p:ph type="title"/>
+          </p:nvPr>
+        </p:nvSpPr>
+        <p:spPr/>
+        <p:txBody>
+          <a:bodyPr/>
+          <a:lstStyle/>
+          <a:p>
+            <a:r>
+              <a:rPr lang="zh-CN" altLang="en-US" dirty="0" smtClean="0"/>
+              <a:t>设计哲学与工程考量</a:t>
+            </a:r>
+            <a:endParaRPr lang="zh-CN" altLang="en-US" dirty="0"/>
+          </a:p>
+        </p:txBody>
+      </p:sp>
+      <p:sp>
+        <p:nvSpPr>
+          <p:cNvPr id="3" name="内容占位符 2"/>
+          <p:cNvSpPr>
+            <a:spLocks noGrp="1"/>
+          </p:cNvSpPr>
+          <p:nvPr>
+            <p:ph idx="1"/>
+          </p:nvPr>
+        </p:nvSpPr>
+        <p:spPr>
+          <a:xfrm>
+            <a:off x="838200" y="2193925"/>
+            <a:ext cx="10515600" cy="4351338"/>
+          </a:xfrm>
+        </p:spPr>
+        <p:txBody>
+          <a:bodyPr>
+            <a:normAutofit fontScale="92500" lnSpcReduction="20000"/>
+          </a:bodyPr>
+          <a:lstStyle/>
+          <a:p>
+            <a:r>
+              <a:rPr lang="zh-CN" altLang="en-US" dirty="0" smtClean="0"/>
+              <a:t>小</a:t>
+            </a:r>
+            <a:r>
+              <a:rPr lang="zh-CN" altLang="en-US" dirty="0"/>
+              <a:t>即是</a:t>
+            </a:r>
+            <a:r>
+              <a:rPr lang="zh-CN" altLang="en-US" dirty="0" smtClean="0"/>
+              <a:t>美</a:t>
+            </a:r>
+            <a:endParaRPr lang="zh-CN" altLang="en-US" dirty="0"/>
+          </a:p>
+          <a:p>
+            <a:r>
+              <a:rPr lang="zh-CN" altLang="en-US" dirty="0"/>
+              <a:t>一</a:t>
+            </a:r>
+            <a:r>
+              <a:rPr lang="zh-CN" altLang="en-US" dirty="0" smtClean="0"/>
+              <a:t>个程序只</a:t>
+            </a:r>
+            <a:r>
+              <a:rPr lang="zh-CN" altLang="en-US" dirty="0"/>
+              <a:t>做好一件</a:t>
+            </a:r>
+            <a:r>
+              <a:rPr lang="zh-CN" altLang="en-US" dirty="0" smtClean="0"/>
+              <a:t>事</a:t>
+            </a:r>
+            <a:endParaRPr lang="zh-CN" altLang="en-US" dirty="0"/>
+          </a:p>
+          <a:p>
+            <a:r>
+              <a:rPr lang="zh-CN" altLang="en-US" dirty="0" smtClean="0"/>
+              <a:t>尽早建立原型</a:t>
+            </a:r>
+            <a:endParaRPr lang="zh-CN" altLang="en-US" dirty="0"/>
+          </a:p>
+          <a:p>
+            <a:r>
+              <a:rPr lang="zh-CN" altLang="en-US" dirty="0" smtClean="0"/>
+              <a:t>可移植性优先于效率</a:t>
+            </a:r>
+            <a:endParaRPr lang="zh-CN" altLang="en-US" dirty="0"/>
+          </a:p>
+          <a:p>
+            <a:r>
+              <a:rPr lang="zh-CN" altLang="en-US" dirty="0" smtClean="0"/>
+              <a:t>数据应保存</a:t>
+            </a:r>
+            <a:r>
+              <a:rPr lang="zh-CN" altLang="en-US" dirty="0"/>
+              <a:t>为</a:t>
+            </a:r>
+            <a:r>
+              <a:rPr lang="zh-CN" altLang="en-US" dirty="0" smtClean="0"/>
+              <a:t>文本文件</a:t>
+            </a:r>
+            <a:endParaRPr lang="zh-CN" altLang="en-US" dirty="0"/>
+          </a:p>
+          <a:p>
+            <a:r>
+              <a:rPr lang="zh-CN" altLang="en-US" dirty="0" smtClean="0"/>
+              <a:t>只要对你有利，榨干软件性能</a:t>
+            </a:r>
+            <a:endParaRPr lang="en-US" altLang="zh-CN" dirty="0" smtClean="0"/>
+          </a:p>
+          <a:p>
+            <a:r>
+              <a:rPr lang="zh-CN" altLang="en-US" dirty="0" smtClean="0"/>
+              <a:t>用</a:t>
+            </a:r>
+            <a:r>
+              <a:rPr lang="en-US" altLang="zh-CN" dirty="0"/>
+              <a:t>shell</a:t>
+            </a:r>
+            <a:r>
+              <a:rPr lang="zh-CN" altLang="en-US" dirty="0" smtClean="0"/>
+              <a:t>脚本提高</a:t>
+            </a:r>
+            <a:r>
+              <a:rPr lang="zh-CN" altLang="en-US" dirty="0"/>
+              <a:t>效率和</a:t>
+            </a:r>
+            <a:r>
+              <a:rPr lang="zh-CN" altLang="en-US" dirty="0" smtClean="0"/>
+              <a:t>可移植性</a:t>
+            </a:r>
+            <a:endParaRPr lang="zh-CN" altLang="en-US" dirty="0"/>
+          </a:p>
+          <a:p>
+            <a:r>
+              <a:rPr lang="zh-CN" altLang="en-US" dirty="0" smtClean="0"/>
+              <a:t>避免华而不实的</a:t>
+            </a:r>
+            <a:r>
+              <a:rPr lang="zh-CN" altLang="en-US" dirty="0"/>
+              <a:t>用户</a:t>
+            </a:r>
+            <a:r>
+              <a:rPr lang="zh-CN" altLang="en-US" dirty="0" smtClean="0"/>
+              <a:t>界面</a:t>
+            </a:r>
+            <a:endParaRPr lang="zh-CN" altLang="en-US" dirty="0"/>
+          </a:p>
+          <a:p>
+            <a:r>
+              <a:rPr lang="zh-CN" altLang="en-US" dirty="0" smtClean="0"/>
+              <a:t>让程序作为数据的过滤器</a:t>
+            </a:r>
+            <a:endParaRPr lang="en-US" altLang="zh-CN" dirty="0" smtClean="0"/>
+          </a:p>
+          <a:p>
+            <a:r>
+              <a:rPr lang="en-US" altLang="zh-CN" dirty="0" smtClean="0"/>
+              <a:t>……</a:t>
+            </a:r>
+            <a:endParaRPr lang="zh-CN" altLang="en-US" dirty="0"/>
+          </a:p>
+        </p:txBody>
+      </p:sp>
+      <p:sp>
+        <p:nvSpPr>
+          <p:cNvPr id="4" name="文本框 3"/>
+          <p:cNvSpPr txBox="1"/>
+          <p:nvPr/>
+        </p:nvSpPr>
+        <p:spPr>
+          <a:xfrm>
+            <a:off x="838200" y="1458913"/>
+            <a:ext cx="5333384" cy="523220"/>
+          </a:xfrm>
+          <a:prstGeom prst="rect">
+            <a:avLst/>
+          </a:prstGeom>
+          <a:noFill/>
+        </p:spPr>
+        <p:txBody>
+          <a:bodyPr wrap="none" rtlCol="0">
+            <a:spAutoFit/>
+          </a:bodyPr>
+          <a:lstStyle/>
+          <a:p>
+            <a:pPr algn="ctr"/>
+            <a:r>
+              <a:rPr lang="en-US" altLang="zh-CN" sz="2800" dirty="0"/>
+              <a:t>Mike </a:t>
+            </a:r>
+            <a:r>
+              <a:rPr lang="en-US" altLang="zh-CN" sz="2800" dirty="0" err="1" smtClean="0"/>
+              <a:t>Gancarz</a:t>
+            </a:r>
+            <a:r>
+              <a:rPr lang="en-US" altLang="zh-CN" sz="2800" dirty="0" smtClean="0"/>
+              <a:t>: </a:t>
+            </a:r>
+            <a:r>
+              <a:rPr lang="en-US" altLang="zh-CN" sz="2800" i="1" dirty="0" smtClean="0"/>
+              <a:t>The </a:t>
+            </a:r>
+            <a:r>
+              <a:rPr lang="en-US" altLang="zh-CN" sz="2800" i="1" dirty="0"/>
+              <a:t>UNIX </a:t>
+            </a:r>
+            <a:r>
+              <a:rPr lang="en-US" altLang="zh-CN" sz="2800" i="1" dirty="0" smtClean="0"/>
+              <a:t>Philosophy</a:t>
+            </a:r>
+            <a:endParaRPr lang="zh-CN" altLang="en-US" sz="2800" i="1" dirty="0" smtClean="0">
+              <a:latin typeface="微软雅黑" panose="020B0503020204020204" pitchFamily="34" charset="-122"/>
+              <a:ea typeface="微软雅黑" panose="020B0503020204020204" pitchFamily="34" charset="-122"/>
+            </a:endParaRPr>
+          </a:p>
+        </p:txBody>
+      </p:sp>
+      <p:pic>
+        <p:nvPicPr>
+          <p:cNvPr id="5" name="图片 4"/>
+          <p:cNvPicPr>
+            <a:picLocks noChangeAspect="1"/>
+          </p:cNvPicPr>
+          <p:nvPr/>
+        </p:nvPicPr>
+        <p:blipFill>
+          <a:blip r:embed="rId2">
+            <a:extLst>
+              <a:ext uri="{28A0092B-C50C-407E-A947-70E740481C1C}">
+                <a14:useLocalDpi xmlns:a14="http://schemas.microsoft.com/office/drawing/2010/main" val="0"/>
+              </a:ext>
+            </a:extLst>
+          </a:blip>
+          <a:stretch>
+            <a:fillRect/>
+          </a:stretch>
+        </p:blipFill>
+        <p:spPr>
+          <a:xfrm>
+            <a:off x="7409772" y="49212"/>
+            <a:ext cx="2242009" cy="6759575"/>
+          </a:xfrm>
+          <a:prstGeom prst="rect">
+            <a:avLst/>
+          </a:prstGeom>
+        </p:spPr>
+      </p:pic>
+    </p:spTree>
+    <p:extLst>
+      <p:ext uri="{BB962C8B-B14F-4D97-AF65-F5344CB8AC3E}">
+        <p14:creationId xmlns:p14="http://schemas.microsoft.com/office/powerpoint/2010/main" val="3178606209"/>
+      </p:ext>
+    </p:extLst>
+  </p:cSld>
+  <p:clrMapOvr>
+    <a:masterClrMapping/>
+  </p:clrMapOvr>
+  <p:timing>
+    <p:tnLst>
+      <p:par>
+        <p:cTn id="1" dur="indefinite" restart="never" nodeType="tmRoot"/>
+      </p:par>
+    </p:tnLst>
+  </p:timing>
+</p:sld>
+</file>
+
+<file path=ppt/slides/slide19.xml><?xml version="1.0" encoding="utf-8"?>
 <p:sld xmlns:a="http://schemas.openxmlformats.org/drawingml/2006/main" xmlns:r="http://schemas.openxmlformats.org/officeDocument/2006/relationships" xmlns:p="http://schemas.openxmlformats.org/presentationml/2006/main">
   <p:cSld>
     <p:spTree>
@@ -5852,9 +6055,99 @@
           <a:p>
             <a:r>
               <a:rPr lang="zh-CN" altLang="en-US" dirty="0" smtClean="0"/>
-              <a:t>常用图像增强方法</a:t>
+              <a:t>确定网络架构</a:t>
             </a:r>
             <a:endParaRPr lang="zh-CN" altLang="en-US" dirty="0"/>
+          </a:p>
+        </p:txBody>
+      </p:sp>
+      <p:sp>
+        <p:nvSpPr>
+          <p:cNvPr id="3" name="内容占位符 2"/>
+          <p:cNvSpPr>
+            <a:spLocks noGrp="1"/>
+          </p:cNvSpPr>
+          <p:nvPr>
+            <p:ph idx="1"/>
+          </p:nvPr>
+        </p:nvSpPr>
+        <p:spPr/>
+        <p:txBody>
+          <a:bodyPr/>
+          <a:lstStyle/>
+          <a:p>
+            <a:r>
+              <a:rPr lang="zh-CN" altLang="en-US" dirty="0" smtClean="0"/>
+              <a:t>架构越简单越好</a:t>
+            </a:r>
+            <a:endParaRPr lang="en-US" altLang="zh-CN" dirty="0"/>
+          </a:p>
+          <a:p>
+            <a:pPr lvl="1"/>
+            <a:r>
+              <a:rPr lang="zh-CN" altLang="en-US" dirty="0" smtClean="0"/>
+              <a:t>数据集不同</a:t>
+            </a:r>
+            <a:r>
+              <a:rPr lang="zh-CN" altLang="en-US" dirty="0"/>
+              <a:t>类别</a:t>
+            </a:r>
+            <a:r>
+              <a:rPr lang="zh-CN" altLang="en-US" dirty="0" smtClean="0"/>
+              <a:t>差异明显</a:t>
+            </a:r>
+            <a:endParaRPr lang="en-US" altLang="zh-CN" dirty="0" smtClean="0"/>
+          </a:p>
+          <a:p>
+            <a:pPr lvl="1"/>
+            <a:r>
+              <a:rPr lang="zh-CN" altLang="en-US" dirty="0" smtClean="0"/>
+              <a:t>性能高</a:t>
+            </a:r>
+            <a:endParaRPr lang="en-US" altLang="zh-CN" dirty="0" smtClean="0"/>
+          </a:p>
+          <a:p>
+            <a:pPr lvl="1"/>
+            <a:r>
+              <a:rPr lang="zh-CN" altLang="en-US" dirty="0" smtClean="0"/>
+              <a:t>实现时错误少</a:t>
+            </a:r>
+            <a:endParaRPr lang="en-US" altLang="zh-CN" dirty="0" smtClean="0"/>
+          </a:p>
+          <a:p>
+            <a:pPr lvl="1"/>
+            <a:endParaRPr lang="en-US" altLang="zh-CN" dirty="0" smtClean="0"/>
+          </a:p>
+          <a:p>
+            <a:r>
+              <a:rPr lang="zh-CN" altLang="en-US" dirty="0" smtClean="0"/>
+              <a:t>隐藏层节点数尽可能少</a:t>
+            </a:r>
+            <a:endParaRPr lang="en-US" altLang="zh-CN" dirty="0" smtClean="0"/>
+          </a:p>
+          <a:p>
+            <a:pPr lvl="1"/>
+            <a:r>
+              <a:rPr lang="zh-CN" altLang="en-US" dirty="0" smtClean="0"/>
+              <a:t>性能高</a:t>
+            </a:r>
+            <a:endParaRPr lang="en-US" altLang="zh-CN" dirty="0" smtClean="0"/>
+          </a:p>
+          <a:p>
+            <a:pPr lvl="1"/>
+            <a:r>
+              <a:rPr lang="zh-CN" altLang="en-US" dirty="0" smtClean="0"/>
+              <a:t>避免过拟合</a:t>
+            </a:r>
+            <a:endParaRPr lang="en-US" altLang="zh-CN" dirty="0" smtClean="0"/>
+          </a:p>
+          <a:p>
+            <a:pPr lvl="1"/>
+            <a:r>
+              <a:rPr lang="zh-CN" altLang="en-US" dirty="0" smtClean="0"/>
+              <a:t>方便调参</a:t>
+            </a:r>
+            <a:endParaRPr lang="en-US" altLang="zh-CN" dirty="0" smtClean="0"/>
           </a:p>
         </p:txBody>
       </p:sp>
@@ -5880,8 +6173,8 @@
         </p:blipFill>
         <p:spPr>
           <a:xfrm>
-            <a:off x="1864702" y="1320800"/>
-            <a:ext cx="8462596" cy="5334000"/>
+            <a:off x="5147538" y="1403350"/>
+            <a:ext cx="6930162" cy="4051300"/>
           </a:xfrm>
           <a:prstGeom prst="rect">
             <a:avLst/>
@@ -5891,7 +6184,7 @@
     </p:spTree>
     <p:extLst>
       <p:ext uri="{BB962C8B-B14F-4D97-AF65-F5344CB8AC3E}">
-        <p14:creationId xmlns:p14="http://schemas.microsoft.com/office/powerpoint/2010/main" val="3964308440"/>
+        <p14:creationId xmlns:p14="http://schemas.microsoft.com/office/powerpoint/2010/main" val="2050883672"/>
       </p:ext>
     </p:extLst>
   </p:cSld>
@@ -5942,7 +6235,95 @@
           <a:p>
             <a:r>
               <a:rPr lang="zh-CN" altLang="en-US" dirty="0" smtClean="0"/>
-              <a:t>混合使用各种图像增强方法</a:t>
+              <a:t>网络参数</a:t>
+            </a:r>
+            <a:endParaRPr lang="zh-CN" altLang="en-US" dirty="0"/>
+          </a:p>
+        </p:txBody>
+      </p:sp>
+      <p:sp>
+        <p:nvSpPr>
+          <p:cNvPr id="3" name="内容占位符 2"/>
+          <p:cNvSpPr>
+            <a:spLocks noGrp="1"/>
+          </p:cNvSpPr>
+          <p:nvPr>
+            <p:ph idx="1"/>
+          </p:nvPr>
+        </p:nvSpPr>
+        <p:spPr/>
+        <p:txBody>
+          <a:bodyPr/>
+          <a:lstStyle/>
+          <a:p>
+            <a:pPr>
+              <a:lnSpc>
+                <a:spcPct val="100000"/>
+              </a:lnSpc>
+            </a:pPr>
+            <a:r>
+              <a:rPr lang="zh-CN" altLang="en-US" dirty="0" smtClean="0"/>
+              <a:t>输入节点数：</a:t>
+            </a:r>
+            <a:r>
+              <a:rPr lang="en-US" altLang="zh-CN" dirty="0" smtClean="0"/>
+              <a:t>10x10=100</a:t>
+            </a:r>
+          </a:p>
+          <a:p>
+            <a:pPr>
+              <a:lnSpc>
+                <a:spcPct val="100000"/>
+              </a:lnSpc>
+            </a:pPr>
+            <a:r>
+              <a:rPr lang="zh-CN" altLang="en-US" dirty="0" smtClean="0"/>
+              <a:t>输出节点数：</a:t>
+            </a:r>
+            <a:r>
+              <a:rPr lang="en-US" altLang="zh-CN" dirty="0" smtClean="0"/>
+              <a:t>4</a:t>
+            </a:r>
+          </a:p>
+          <a:p>
+            <a:pPr>
+              <a:lnSpc>
+                <a:spcPct val="100000"/>
+              </a:lnSpc>
+            </a:pPr>
+            <a:r>
+              <a:rPr lang="zh-CN" altLang="en-US" dirty="0" smtClean="0"/>
+              <a:t>隐藏层层数：</a:t>
+            </a:r>
+            <a:r>
+              <a:rPr lang="en-US" altLang="zh-CN" dirty="0" smtClean="0"/>
+              <a:t>1</a:t>
+            </a:r>
+          </a:p>
+          <a:p>
+            <a:pPr>
+              <a:lnSpc>
+                <a:spcPct val="100000"/>
+              </a:lnSpc>
+            </a:pPr>
+            <a:r>
+              <a:rPr lang="zh-CN" altLang="en-US" dirty="0" smtClean="0"/>
+              <a:t>隐藏层节点数：</a:t>
+            </a:r>
+            <a:r>
+              <a:rPr lang="en-US" altLang="zh-CN" dirty="0" smtClean="0"/>
+              <a:t>5</a:t>
+            </a:r>
+          </a:p>
+          <a:p>
+            <a:pPr lvl="1">
+              <a:lnSpc>
+                <a:spcPct val="100000"/>
+              </a:lnSpc>
+            </a:pPr>
+            <a:r>
+              <a:rPr lang="zh-CN" altLang="en-US" dirty="0" smtClean="0"/>
+              <a:t>经验公式</a:t>
             </a:r>
             <a:endParaRPr lang="zh-CN" altLang="en-US" dirty="0"/>
           </a:p>
@@ -5950,7 +6331,7 @@
       </p:sp>
       <p:pic>
         <p:nvPicPr>
-          <p:cNvPr id="3" name="图片 2"/>
+          <p:cNvPr id="4" name="图片 3"/>
           <p:cNvPicPr>
             <a:picLocks noChangeAspect="1"/>
           </p:cNvPicPr>
@@ -5970,8 +6351,38 @@
         </p:blipFill>
         <p:spPr>
           <a:xfrm>
-            <a:off x="3378200" y="1231900"/>
-            <a:ext cx="5435600" cy="5435600"/>
+            <a:off x="1917700" y="4409073"/>
+            <a:ext cx="7922652" cy="1075915"/>
+          </a:xfrm>
+          <a:prstGeom prst="rect">
+            <a:avLst/>
+          </a:prstGeom>
+        </p:spPr>
+      </p:pic>
+      <p:pic>
+        <p:nvPicPr>
+          <p:cNvPr id="5" name="图片 4"/>
+          <p:cNvPicPr>
+            <a:picLocks noChangeAspect="1"/>
+          </p:cNvPicPr>
+          <p:nvPr/>
+        </p:nvPicPr>
+        <p:blipFill>
+          <a:blip r:embed="rId3">
+            <a:extLst>
+              <a:ext uri="{28A0092B-C50C-407E-A947-70E740481C1C}">
+                <a14:useLocalDpi xmlns:a14="http://schemas.microsoft.com/office/drawing/2010/main" val="0"/>
+              </a:ext>
+            </a:extLst>
+          </a:blip>
+          <a:stretch>
+            <a:fillRect/>
+          </a:stretch>
+        </p:blipFill>
+        <p:spPr>
+          <a:xfrm>
+            <a:off x="1917700" y="5353284"/>
+            <a:ext cx="6031870" cy="636529"/>
           </a:xfrm>
           <a:prstGeom prst="rect">
             <a:avLst/>
@@ -5981,7 +6392,7 @@
     </p:spTree>
     <p:extLst>
       <p:ext uri="{BB962C8B-B14F-4D97-AF65-F5344CB8AC3E}">
-        <p14:creationId xmlns:p14="http://schemas.microsoft.com/office/powerpoint/2010/main" val="2823502555"/>
+        <p14:creationId xmlns:p14="http://schemas.microsoft.com/office/powerpoint/2010/main" val="247881510"/>
       </p:ext>
     </p:extLst>
   </p:cSld>
@@ -6032,7 +6443,7 @@
           <a:p>
             <a:r>
               <a:rPr lang="zh-CN" altLang="en-US" dirty="0" smtClean="0"/>
-              <a:t>确定网络架构</a:t>
+              <a:t>实现并训练神经网络</a:t>
             </a:r>
             <a:endParaRPr lang="zh-CN" altLang="en-US" dirty="0"/>
           </a:p>
@@ -6048,81 +6459,40 @@
             <p:ph idx="1"/>
           </p:nvPr>
         </p:nvSpPr>
-        <p:spPr/>
+        <p:spPr>
+          <a:xfrm>
+            <a:off x="838200" y="1825625"/>
+            <a:ext cx="4832201" cy="4351338"/>
+          </a:xfrm>
+        </p:spPr>
         <p:txBody>
           <a:bodyPr/>
           <a:lstStyle/>
           <a:p>
-            <a:r>
-              <a:rPr lang="zh-CN" altLang="en-US" dirty="0" smtClean="0"/>
-              <a:t>架构越简单越好</a:t>
+            <a:pPr>
+              <a:lnSpc>
+                <a:spcPct val="150000"/>
+              </a:lnSpc>
+            </a:pPr>
+            <a:r>
+              <a:rPr lang="zh-CN" altLang="en-US" dirty="0"/>
+              <a:t>前</a:t>
+            </a:r>
+            <a:r>
+              <a:rPr lang="zh-CN" altLang="en-US" dirty="0" smtClean="0"/>
+              <a:t>向传播</a:t>
             </a:r>
             <a:endParaRPr lang="en-US" altLang="zh-CN" dirty="0"/>
           </a:p>
           <a:p>
-            <a:pPr lvl="1"/>
-            <a:r>
-              <a:rPr lang="zh-CN" altLang="en-US" dirty="0" smtClean="0"/>
-              <a:t>数据集不同</a:t>
-            </a:r>
-            <a:r>
-              <a:rPr lang="zh-CN" altLang="en-US" dirty="0"/>
-              <a:t>类别</a:t>
-            </a:r>
-            <a:r>
-              <a:rPr lang="zh-CN" altLang="en-US" dirty="0" smtClean="0"/>
-              <a:t>差异明显</a:t>
-            </a:r>
-            <a:endParaRPr lang="en-US" altLang="zh-CN" dirty="0" smtClean="0"/>
-          </a:p>
-          <a:p>
-            <a:pPr lvl="1"/>
-            <a:r>
-              <a:rPr lang="zh-CN" altLang="en-US" dirty="0" smtClean="0"/>
-              <a:t>性能高</a:t>
-            </a:r>
-            <a:endParaRPr lang="en-US" altLang="zh-CN" dirty="0" smtClean="0"/>
-          </a:p>
-          <a:p>
-            <a:pPr lvl="1"/>
-            <a:r>
-              <a:rPr lang="zh-CN" altLang="en-US" dirty="0" smtClean="0"/>
-              <a:t>实现时错误少</a:t>
-            </a:r>
-            <a:endParaRPr lang="en-US" altLang="zh-CN" dirty="0" smtClean="0"/>
-          </a:p>
-          <a:p>
-            <a:pPr lvl="1"/>
-            <a:endParaRPr lang="en-US" altLang="zh-CN" dirty="0" smtClean="0"/>
-          </a:p>
-          <a:p>
-            <a:r>
-              <a:rPr lang="zh-CN" altLang="en-US" dirty="0" smtClean="0"/>
-              <a:t>隐藏层节点数尽可能少</a:t>
-            </a:r>
-            <a:endParaRPr lang="en-US" altLang="zh-CN" dirty="0" smtClean="0"/>
-          </a:p>
-          <a:p>
-            <a:pPr lvl="1"/>
-            <a:r>
-              <a:rPr lang="zh-CN" altLang="en-US" dirty="0" smtClean="0"/>
-              <a:t>性能高</a:t>
-            </a:r>
-            <a:endParaRPr lang="en-US" altLang="zh-CN" dirty="0" smtClean="0"/>
-          </a:p>
-          <a:p>
-            <a:pPr lvl="1"/>
-            <a:r>
-              <a:rPr lang="zh-CN" altLang="en-US" dirty="0" smtClean="0"/>
-              <a:t>避免过拟合</a:t>
-            </a:r>
-            <a:endParaRPr lang="en-US" altLang="zh-CN" dirty="0" smtClean="0"/>
-          </a:p>
-          <a:p>
-            <a:pPr lvl="1"/>
-            <a:r>
-              <a:rPr lang="zh-CN" altLang="en-US" dirty="0" smtClean="0"/>
-              <a:t>方便调参</a:t>
+            <a:pPr lvl="1">
+              <a:lnSpc>
+                <a:spcPct val="150000"/>
+              </a:lnSpc>
+            </a:pPr>
+            <a:r>
+              <a:rPr lang="zh-CN" altLang="en-US" dirty="0" smtClean="0"/>
+              <a:t>由上一层节点的输出和权重，计算得到下一次节点的值</a:t>
             </a:r>
             <a:endParaRPr lang="en-US" altLang="zh-CN" dirty="0" smtClean="0"/>
           </a:p>
@@ -6130,7 +6500,7 @@
       </p:sp>
       <p:pic>
         <p:nvPicPr>
-          <p:cNvPr id="4" name="图片 3"/>
+          <p:cNvPr id="5" name="图片 4"/>
           <p:cNvPicPr>
             <a:picLocks noChangeAspect="1"/>
           </p:cNvPicPr>
@@ -6150,8 +6520,8 @@
         </p:blipFill>
         <p:spPr>
           <a:xfrm>
-            <a:off x="5147538" y="1403350"/>
-            <a:ext cx="6930162" cy="4051300"/>
+            <a:off x="5670401" y="1927817"/>
+            <a:ext cx="5683399" cy="3302355"/>
           </a:xfrm>
           <a:prstGeom prst="rect">
             <a:avLst/>
@@ -6161,7 +6531,7 @@
     </p:spTree>
     <p:extLst>
       <p:ext uri="{BB962C8B-B14F-4D97-AF65-F5344CB8AC3E}">
-        <p14:creationId xmlns:p14="http://schemas.microsoft.com/office/powerpoint/2010/main" val="2050883672"/>
+        <p14:creationId xmlns:p14="http://schemas.microsoft.com/office/powerpoint/2010/main" val="3368566670"/>
       </p:ext>
     </p:extLst>
   </p:cSld>
@@ -6212,7 +6582,7 @@
           <a:p>
             <a:r>
               <a:rPr lang="zh-CN" altLang="en-US" dirty="0" smtClean="0"/>
-              <a:t>网络参数</a:t>
+              <a:t>实现并训练神经网络</a:t>
             </a:r>
             <a:endParaRPr lang="zh-CN" altLang="en-US" dirty="0"/>
           </a:p>
@@ -6228,81 +6598,50 @@
             <p:ph idx="1"/>
           </p:nvPr>
         </p:nvSpPr>
-        <p:spPr/>
+        <p:spPr>
+          <a:xfrm>
+            <a:off x="838200" y="1825625"/>
+            <a:ext cx="4832201" cy="4351338"/>
+          </a:xfrm>
+        </p:spPr>
         <p:txBody>
           <a:bodyPr/>
           <a:lstStyle/>
           <a:p>
             <a:pPr>
               <a:lnSpc>
-                <a:spcPct val="100000"/>
+                <a:spcPct val="150000"/>
               </a:lnSpc>
             </a:pPr>
             <a:r>
               <a:rPr lang="zh-CN" altLang="en-US" dirty="0" smtClean="0"/>
-              <a:t>输入节点数：</a:t>
-            </a:r>
-            <a:r>
-              <a:rPr lang="en-US" altLang="zh-CN" dirty="0" smtClean="0"/>
-              <a:t>10x10=100</a:t>
-            </a:r>
-          </a:p>
-          <a:p>
-            <a:pPr>
+              <a:t>反向传播</a:t>
+            </a:r>
+            <a:endParaRPr lang="en-US" altLang="zh-CN" dirty="0" smtClean="0"/>
+          </a:p>
+          <a:p>
+            <a:pPr lvl="1">
               <a:lnSpc>
-                <a:spcPct val="100000"/>
+                <a:spcPct val="150000"/>
               </a:lnSpc>
             </a:pPr>
             <a:r>
               <a:rPr lang="zh-CN" altLang="en-US" dirty="0" smtClean="0"/>
-              <a:t>输出节点数：</a:t>
-            </a:r>
-            <a:r>
-              <a:rPr lang="en-US" altLang="zh-CN" dirty="0" smtClean="0"/>
-              <a:t>4</a:t>
-            </a:r>
-          </a:p>
-          <a:p>
-            <a:pPr>
+              <a:t>误差计算</a:t>
+            </a:r>
+            <a:endParaRPr lang="en-US" altLang="zh-CN" dirty="0" smtClean="0"/>
+          </a:p>
+          <a:p>
+            <a:pPr lvl="1">
               <a:lnSpc>
-                <a:spcPct val="100000"/>
+                <a:spcPct val="150000"/>
               </a:lnSpc>
             </a:pPr>
             <a:r>
               <a:rPr lang="zh-CN" altLang="en-US" dirty="0" smtClean="0"/>
-              <a:t>隐藏层层数：</a:t>
-            </a:r>
-            <a:r>
-              <a:rPr lang="en-US" altLang="zh-CN" dirty="0" smtClean="0"/>
-              <a:t>1</a:t>
-            </a:r>
-          </a:p>
-          <a:p>
-            <a:pPr>
-              <a:lnSpc>
-                <a:spcPct val="100000"/>
-              </a:lnSpc>
-            </a:pPr>
-            <a:r>
-              <a:rPr lang="zh-CN" altLang="en-US" dirty="0" smtClean="0"/>
-              <a:t>隐藏层节点数：</a:t>
-            </a:r>
-            <a:r>
-              <a:rPr lang="en-US" altLang="zh-CN" dirty="0" smtClean="0"/>
-              <a:t>5</a:t>
-            </a:r>
-          </a:p>
-          <a:p>
-            <a:pPr lvl="1">
-              <a:lnSpc>
-                <a:spcPct val="100000"/>
-              </a:lnSpc>
-            </a:pPr>
-            <a:r>
-              <a:rPr lang="zh-CN" altLang="en-US" dirty="0" smtClean="0"/>
-              <a:t>经验公式</a:t>
-            </a:r>
-            <a:endParaRPr lang="zh-CN" altLang="en-US" dirty="0"/>
+              <a:t>权重更新</a:t>
+            </a:r>
+            <a:endParaRPr lang="en-US" altLang="zh-CN" dirty="0"/>
           </a:p>
         </p:txBody>
       </p:sp>
@@ -6328,38 +6667,8 @@
         </p:blipFill>
         <p:spPr>
           <a:xfrm>
-            <a:off x="1917700" y="4409073"/>
-            <a:ext cx="7922652" cy="1075915"/>
-          </a:xfrm>
-          <a:prstGeom prst="rect">
-            <a:avLst/>
-          </a:prstGeom>
-        </p:spPr>
-      </p:pic>
-      <p:pic>
-        <p:nvPicPr>
-          <p:cNvPr id="5" name="图片 4"/>
-          <p:cNvPicPr>
-            <a:picLocks noChangeAspect="1"/>
-          </p:cNvPicPr>
-          <p:nvPr/>
-        </p:nvPicPr>
-        <p:blipFill>
-          <a:blip r:embed="rId3">
-            <a:extLst>
-              <a:ext uri="{28A0092B-C50C-407E-A947-70E740481C1C}">
-                <a14:useLocalDpi xmlns:a14="http://schemas.microsoft.com/office/drawing/2010/main" val="0"/>
-              </a:ext>
-            </a:extLst>
-          </a:blip>
-          <a:stretch>
-            <a:fillRect/>
-          </a:stretch>
-        </p:blipFill>
-        <p:spPr>
-          <a:xfrm>
-            <a:off x="1917700" y="5353284"/>
-            <a:ext cx="6031870" cy="636529"/>
+            <a:off x="4368801" y="1533766"/>
+            <a:ext cx="6602536" cy="4846398"/>
           </a:xfrm>
           <a:prstGeom prst="rect">
             <a:avLst/>
@@ -6369,7 +6678,7 @@
     </p:spTree>
     <p:extLst>
       <p:ext uri="{BB962C8B-B14F-4D97-AF65-F5344CB8AC3E}">
-        <p14:creationId xmlns:p14="http://schemas.microsoft.com/office/powerpoint/2010/main" val="247881510"/>
+        <p14:creationId xmlns:p14="http://schemas.microsoft.com/office/powerpoint/2010/main" val="1095232721"/>
       </p:ext>
     </p:extLst>
   </p:cSld>
@@ -6420,64 +6729,15 @@
           <a:p>
             <a:r>
               <a:rPr lang="zh-CN" altLang="en-US" dirty="0" smtClean="0"/>
-              <a:t>实现并训练神经网络</a:t>
+              <a:t>训练过程</a:t>
             </a:r>
             <a:endParaRPr lang="zh-CN" altLang="en-US" dirty="0"/>
-          </a:p>
-        </p:txBody>
-      </p:sp>
-      <p:sp>
-        <p:nvSpPr>
-          <p:cNvPr id="3" name="内容占位符 2"/>
-          <p:cNvSpPr>
-            <a:spLocks noGrp="1"/>
-          </p:cNvSpPr>
-          <p:nvPr>
-            <p:ph idx="1"/>
-          </p:nvPr>
-        </p:nvSpPr>
-        <p:spPr>
-          <a:xfrm>
-            <a:off x="838200" y="1825625"/>
-            <a:ext cx="4832201" cy="4351338"/>
-          </a:xfrm>
-        </p:spPr>
-        <p:txBody>
-          <a:bodyPr/>
-          <a:lstStyle/>
-          <a:p>
-            <a:pPr>
-              <a:lnSpc>
-                <a:spcPct val="150000"/>
-              </a:lnSpc>
-            </a:pPr>
-            <a:r>
-              <a:rPr lang="zh-CN" altLang="en-US" dirty="0"/>
-              <a:t>前</a:t>
-            </a:r>
-            <a:r>
-              <a:rPr lang="zh-CN" altLang="en-US" dirty="0" smtClean="0"/>
-              <a:t>向传播</a:t>
-            </a:r>
-            <a:endParaRPr lang="en-US" altLang="zh-CN" dirty="0"/>
-          </a:p>
-          <a:p>
-            <a:pPr lvl="1">
-              <a:lnSpc>
-                <a:spcPct val="150000"/>
-              </a:lnSpc>
-            </a:pPr>
-            <a:r>
-              <a:rPr lang="zh-CN" altLang="en-US" dirty="0" smtClean="0"/>
-              <a:t>由上一层节点的输出和权重，计算得到下一次节点的值</a:t>
-            </a:r>
-            <a:endParaRPr lang="en-US" altLang="zh-CN" dirty="0" smtClean="0"/>
           </a:p>
         </p:txBody>
       </p:sp>
       <p:pic>
         <p:nvPicPr>
-          <p:cNvPr id="5" name="图片 4"/>
+          <p:cNvPr id="4" name="图片 3"/>
           <p:cNvPicPr>
             <a:picLocks noChangeAspect="1"/>
           </p:cNvPicPr>
@@ -6497,18 +6757,119 @@
         </p:blipFill>
         <p:spPr>
           <a:xfrm>
-            <a:off x="5670401" y="1927817"/>
-            <a:ext cx="5683399" cy="3302355"/>
+            <a:off x="3427757" y="953219"/>
+            <a:ext cx="5514286" cy="5752381"/>
           </a:xfrm>
           <a:prstGeom prst="rect">
             <a:avLst/>
           </a:prstGeom>
         </p:spPr>
       </p:pic>
+      <p:sp>
+        <p:nvSpPr>
+          <p:cNvPr id="5" name="矩形 4"/>
+          <p:cNvSpPr/>
+          <p:nvPr/>
+        </p:nvSpPr>
+        <p:spPr>
+          <a:xfrm>
+            <a:off x="3427757" y="953219"/>
+            <a:ext cx="5514286" cy="215181"/>
+          </a:xfrm>
+          <a:prstGeom prst="rect">
+            <a:avLst/>
+          </a:prstGeom>
+          <a:noFill/>
+          <a:ln w="38100">
+            <a:solidFill>
+              <a:srgbClr val="FF0000"/>
+            </a:solidFill>
+          </a:ln>
+        </p:spPr>
+        <p:style>
+          <a:lnRef idx="2">
+            <a:schemeClr val="accent1">
+              <a:shade val="50000"/>
+            </a:schemeClr>
+          </a:lnRef>
+          <a:fillRef idx="1">
+            <a:schemeClr val="accent1"/>
+          </a:fillRef>
+          <a:effectRef idx="0">
+            <a:schemeClr val="accent1"/>
+          </a:effectRef>
+          <a:fontRef idx="minor">
+            <a:schemeClr val="lt1"/>
+          </a:fontRef>
+        </p:style>
+        <p:txBody>
+          <a:bodyPr rtlCol="0" anchor="ctr"/>
+          <a:lstStyle/>
+          <a:p>
+            <a:pPr algn="ctr"/>
+            <a:endParaRPr lang="zh-CN" altLang="en-US"/>
+          </a:p>
+        </p:txBody>
+      </p:sp>
+      <p:sp>
+        <p:nvSpPr>
+          <p:cNvPr id="6" name="矩形 5"/>
+          <p:cNvSpPr/>
+          <p:nvPr/>
+        </p:nvSpPr>
+        <p:spPr>
+          <a:xfrm>
+            <a:off x="3427757" y="6019800"/>
+            <a:ext cx="5514286" cy="685800"/>
+          </a:xfrm>
+          <a:prstGeom prst="rect">
+            <a:avLst/>
+          </a:prstGeom>
+          <a:solidFill>
+            <a:srgbClr val="A9D18E">
+              <a:alpha val="43922"/>
+            </a:srgbClr>
+          </a:solidFill>
+          <a:ln w="38100">
+            <a:solidFill>
+              <a:srgbClr val="00B050"/>
+            </a:solidFill>
+          </a:ln>
+        </p:spPr>
+        <p:style>
+          <a:lnRef idx="2">
+            <a:schemeClr val="accent1">
+              <a:shade val="50000"/>
+            </a:schemeClr>
+          </a:lnRef>
+          <a:fillRef idx="1">
+            <a:schemeClr val="accent1"/>
+          </a:fillRef>
+          <a:effectRef idx="0">
+            <a:schemeClr val="accent1"/>
+          </a:effectRef>
+          <a:fontRef idx="minor">
+            <a:schemeClr val="lt1"/>
+          </a:fontRef>
+        </p:style>
+        <p:txBody>
+          <a:bodyPr rot="0" spcFirstLastPara="0" vertOverflow="overflow" horzOverflow="overflow" vert="horz" wrap="square" lIns="91440" tIns="45720" rIns="91440" bIns="45720" numCol="1" spcCol="0" rtlCol="0" fromWordArt="0" anchor="ctr" anchorCtr="0" forceAA="0" compatLnSpc="1">
+            <a:prstTxWarp prst="textNoShape">
+              <a:avLst/>
+            </a:prstTxWarp>
+            <a:noAutofit/>
+          </a:bodyPr>
+          <a:lstStyle/>
+          <a:p>
+            <a:pPr algn="ctr"/>
+            <a:endParaRPr lang="zh-CN" altLang="en-US"/>
+          </a:p>
+        </p:txBody>
+      </p:sp>
     </p:spTree>
     <p:extLst>
       <p:ext uri="{BB962C8B-B14F-4D97-AF65-F5344CB8AC3E}">
-        <p14:creationId xmlns:p14="http://schemas.microsoft.com/office/powerpoint/2010/main" val="3368566670"/>
+        <p14:creationId xmlns:p14="http://schemas.microsoft.com/office/powerpoint/2010/main" val="4039218647"/>
       </p:ext>
     </p:extLst>
   </p:cSld>
@@ -6542,86 +6903,6 @@
           <a:chExt cx="0" cy="0"/>
         </a:xfrm>
       </p:grpSpPr>
-      <p:sp>
-        <p:nvSpPr>
-          <p:cNvPr id="2" name="标题 1"/>
-          <p:cNvSpPr>
-            <a:spLocks noGrp="1"/>
-          </p:cNvSpPr>
-          <p:nvPr>
-            <p:ph type="title"/>
-          </p:nvPr>
-        </p:nvSpPr>
-        <p:spPr/>
-        <p:txBody>
-          <a:bodyPr/>
-          <a:lstStyle/>
-          <a:p>
-            <a:r>
-              <a:rPr lang="zh-CN" altLang="en-US" dirty="0" smtClean="0"/>
-              <a:t>实现并训练神经网络</a:t>
-            </a:r>
-            <a:endParaRPr lang="zh-CN" altLang="en-US" dirty="0"/>
-          </a:p>
-        </p:txBody>
-      </p:sp>
-      <p:sp>
-        <p:nvSpPr>
-          <p:cNvPr id="3" name="内容占位符 2"/>
-          <p:cNvSpPr>
-            <a:spLocks noGrp="1"/>
-          </p:cNvSpPr>
-          <p:nvPr>
-            <p:ph idx="1"/>
-          </p:nvPr>
-        </p:nvSpPr>
-        <p:spPr>
-          <a:xfrm>
-            <a:off x="838200" y="1825625"/>
-            <a:ext cx="4832201" cy="4351338"/>
-          </a:xfrm>
-        </p:spPr>
-        <p:txBody>
-          <a:bodyPr/>
-          <a:lstStyle/>
-          <a:p>
-            <a:pPr>
-              <a:lnSpc>
-                <a:spcPct val="150000"/>
-              </a:lnSpc>
-            </a:pPr>
-            <a:r>
-              <a:rPr lang="zh-CN" altLang="en-US" dirty="0" smtClean="0"/>
-              <a:t>反向传播</a:t>
-            </a:r>
-            <a:endParaRPr lang="en-US" altLang="zh-CN" dirty="0" smtClean="0"/>
-          </a:p>
-          <a:p>
-            <a:pPr lvl="1">
-              <a:lnSpc>
-                <a:spcPct val="150000"/>
-              </a:lnSpc>
-            </a:pPr>
-            <a:r>
-              <a:rPr lang="zh-CN" altLang="en-US" dirty="0" smtClean="0"/>
-              <a:t>误差计算</a:t>
-            </a:r>
-            <a:endParaRPr lang="en-US" altLang="zh-CN" dirty="0" smtClean="0"/>
-          </a:p>
-          <a:p>
-            <a:pPr lvl="1">
-              <a:lnSpc>
-                <a:spcPct val="150000"/>
-              </a:lnSpc>
-            </a:pPr>
-            <a:r>
-              <a:rPr lang="zh-CN" altLang="en-US" dirty="0" smtClean="0"/>
-              <a:t>权重更新</a:t>
-            </a:r>
-            <a:endParaRPr lang="en-US" altLang="zh-CN" dirty="0"/>
-          </a:p>
-        </p:txBody>
-      </p:sp>
       <p:pic>
         <p:nvPicPr>
           <p:cNvPr id="4" name="图片 3"/>
@@ -6644,18 +6925,129 @@
         </p:blipFill>
         <p:spPr>
           <a:xfrm>
-            <a:off x="4368801" y="1533766"/>
-            <a:ext cx="6602536" cy="4846398"/>
+            <a:off x="0" y="1704114"/>
+            <a:ext cx="5742584" cy="3921986"/>
           </a:xfrm>
           <a:prstGeom prst="rect">
             <a:avLst/>
           </a:prstGeom>
         </p:spPr>
       </p:pic>
+      <p:sp>
+        <p:nvSpPr>
+          <p:cNvPr id="2" name="标题 1"/>
+          <p:cNvSpPr>
+            <a:spLocks noGrp="1"/>
+          </p:cNvSpPr>
+          <p:nvPr>
+            <p:ph type="title"/>
+          </p:nvPr>
+        </p:nvSpPr>
+        <p:spPr/>
+        <p:txBody>
+          <a:bodyPr/>
+          <a:lstStyle/>
+          <a:p>
+            <a:r>
+              <a:rPr lang="zh-CN" altLang="en-US" dirty="0" smtClean="0"/>
+              <a:t>训练结果及分析</a:t>
+            </a:r>
+            <a:endParaRPr lang="zh-CN" altLang="en-US" dirty="0"/>
+          </a:p>
+        </p:txBody>
+      </p:sp>
+      <p:sp>
+        <p:nvSpPr>
+          <p:cNvPr id="3" name="内容占位符 2"/>
+          <p:cNvSpPr>
+            <a:spLocks noGrp="1"/>
+          </p:cNvSpPr>
+          <p:nvPr>
+            <p:ph idx="1"/>
+          </p:nvPr>
+        </p:nvSpPr>
+        <p:spPr>
+          <a:xfrm>
+            <a:off x="5346700" y="1800225"/>
+            <a:ext cx="6565900" cy="4351338"/>
+          </a:xfrm>
+        </p:spPr>
+        <p:txBody>
+          <a:bodyPr>
+            <a:normAutofit/>
+          </a:bodyPr>
+          <a:lstStyle/>
+          <a:p>
+            <a:r>
+              <a:rPr lang="zh-CN" altLang="en-US" sz="2000" dirty="0" smtClean="0"/>
+              <a:t>第 </a:t>
+            </a:r>
+            <a:r>
+              <a:rPr lang="en-US" altLang="zh-CN" sz="2000" dirty="0" smtClean="0"/>
+              <a:t>1 </a:t>
+            </a:r>
+            <a:r>
+              <a:rPr lang="zh-CN" altLang="en-US" sz="2000" dirty="0" smtClean="0"/>
+              <a:t>次迭代就已经有了较高的准确率（约为</a:t>
+            </a:r>
+            <a:r>
+              <a:rPr lang="en-US" altLang="zh-CN" sz="2000" dirty="0" smtClean="0"/>
+              <a:t>88%</a:t>
+            </a:r>
+            <a:r>
+              <a:rPr lang="zh-CN" altLang="en-US" sz="2000" dirty="0" smtClean="0"/>
+              <a:t>），说明生成的训练集数量充足，经过一次迭代就已经使网络的权重达到较佳的状态</a:t>
+            </a:r>
+          </a:p>
+          <a:p>
+            <a:r>
+              <a:rPr lang="zh-CN" altLang="en-US" sz="2000" dirty="0" smtClean="0"/>
+              <a:t>前几次迭代中，准确率出现了微小的波动，说明此时网络还未到达较为稳定的状态，部分训练数据对网络的泛化造成了一定的影响</a:t>
+            </a:r>
+          </a:p>
+          <a:p>
+            <a:r>
+              <a:rPr lang="zh-CN" altLang="en-US" sz="2000" dirty="0" smtClean="0"/>
+              <a:t>在几次迭代以后，准确率稳步上升，并且最终到达 </a:t>
+            </a:r>
+            <a:r>
+              <a:rPr lang="en-US" altLang="zh-CN" sz="2000" dirty="0" smtClean="0"/>
+              <a:t>100%</a:t>
+            </a:r>
+            <a:r>
+              <a:rPr lang="zh-CN" altLang="en-US" sz="2000" dirty="0" smtClean="0"/>
+              <a:t>，说明网络训练状况优良，训练算法较好</a:t>
+            </a:r>
+          </a:p>
+          <a:p>
+            <a:r>
+              <a:rPr lang="zh-CN" altLang="en-US" sz="2000" dirty="0" smtClean="0"/>
+              <a:t>大约 </a:t>
+            </a:r>
+            <a:r>
+              <a:rPr lang="en-US" altLang="zh-CN" sz="2000" dirty="0" smtClean="0"/>
+              <a:t>25 </a:t>
+            </a:r>
+            <a:r>
+              <a:rPr lang="zh-CN" altLang="en-US" sz="2000" dirty="0" smtClean="0"/>
+              <a:t>次左右的迭代，就已经能达到 </a:t>
+            </a:r>
+            <a:r>
+              <a:rPr lang="en-US" altLang="zh-CN" sz="2000" dirty="0" smtClean="0"/>
+              <a:t>100% </a:t>
+            </a:r>
+            <a:r>
+              <a:rPr lang="zh-CN" altLang="en-US" sz="2000" dirty="0" smtClean="0"/>
+              <a:t>的准确率，并且保持稳定，表明我们的学习率选取得较为合适，使得权重收敛状况较好，也从侧面体现了轻量级网络训练较快的优点</a:t>
+            </a:r>
+            <a:endParaRPr lang="zh-CN" altLang="en-US" sz="2000" dirty="0"/>
+          </a:p>
+        </p:txBody>
+      </p:sp>
     </p:spTree>
     <p:extLst>
       <p:ext uri="{BB962C8B-B14F-4D97-AF65-F5344CB8AC3E}">
-        <p14:creationId xmlns:p14="http://schemas.microsoft.com/office/powerpoint/2010/main" val="1095232721"/>
+        <p14:creationId xmlns:p14="http://schemas.microsoft.com/office/powerpoint/2010/main" val="3348038777"/>
       </p:ext>
     </p:extLst>
   </p:cSld>

</xml_diff>